<commit_message>
Finalisation du rapport projet
</commit_message>
<xml_diff>
--- a/Cahier des charges + analyse/Presentation dossier projet.pptx
+++ b/Cahier des charges + analyse/Presentation dossier projet.pptx
@@ -5,7 +5,7 @@
     <p:sldMasterId id="2147483696" r:id="rId1"/>
   </p:sldMasterIdLst>
   <p:notesMasterIdLst>
-    <p:notesMasterId r:id="rId19"/>
+    <p:notesMasterId r:id="rId20"/>
   </p:notesMasterIdLst>
   <p:sldIdLst>
     <p:sldId id="256" r:id="rId2"/>
@@ -25,6 +25,7 @@
     <p:sldId id="270" r:id="rId16"/>
     <p:sldId id="272" r:id="rId17"/>
     <p:sldId id="271" r:id="rId18"/>
+    <p:sldId id="273" r:id="rId19"/>
   </p:sldIdLst>
   <p:sldSz cx="9144000" cy="6858000" type="screen4x3"/>
   <p:notesSz cx="6858000" cy="9144000"/>
@@ -1924,6 +1925,13 @@
         </dgm:presLayoutVars>
       </dgm:prSet>
       <dgm:spPr/>
+      <dgm:t>
+        <a:bodyPr/>
+        <a:lstStyle/>
+        <a:p>
+          <a:endParaRPr lang="fr-FR"/>
+        </a:p>
+      </dgm:t>
     </dgm:pt>
     <dgm:pt modelId="{133342E3-A35E-4C5F-A20D-AFC238D13581}" type="pres">
       <dgm:prSet presAssocID="{DE00E06F-02A9-45F6-931B-ECACD83292B7}" presName="vertOne" presStyleCnt="0"/>
@@ -1936,6 +1944,13 @@
         </dgm:presLayoutVars>
       </dgm:prSet>
       <dgm:spPr/>
+      <dgm:t>
+        <a:bodyPr/>
+        <a:lstStyle/>
+        <a:p>
+          <a:endParaRPr lang="fr-FR"/>
+        </a:p>
+      </dgm:t>
     </dgm:pt>
     <dgm:pt modelId="{C13CC180-244E-4F4A-ABEF-6B9A12715BA4}" type="pres">
       <dgm:prSet presAssocID="{DE00E06F-02A9-45F6-931B-ECACD83292B7}" presName="parTransOne" presStyleCnt="0"/>
@@ -1956,6 +1971,13 @@
         </dgm:presLayoutVars>
       </dgm:prSet>
       <dgm:spPr/>
+      <dgm:t>
+        <a:bodyPr/>
+        <a:lstStyle/>
+        <a:p>
+          <a:endParaRPr lang="fr-FR"/>
+        </a:p>
+      </dgm:t>
     </dgm:pt>
     <dgm:pt modelId="{EAE447B7-8B74-4F36-8B2F-2DFE5A36E866}" type="pres">
       <dgm:prSet presAssocID="{3B6E912E-CED6-4EA6-B523-22C577D19DF2}" presName="horzTwo" presStyleCnt="0"/>
@@ -1976,6 +1998,13 @@
         </dgm:presLayoutVars>
       </dgm:prSet>
       <dgm:spPr/>
+      <dgm:t>
+        <a:bodyPr/>
+        <a:lstStyle/>
+        <a:p>
+          <a:endParaRPr lang="fr-FR"/>
+        </a:p>
+      </dgm:t>
     </dgm:pt>
     <dgm:pt modelId="{9ED1F117-4AC9-4947-956D-3CBFC9853819}" type="pres">
       <dgm:prSet presAssocID="{AC9DD01B-3A89-419C-BCB8-4F7780D3BADC}" presName="horzTwo" presStyleCnt="0"/>
@@ -1996,6 +2025,13 @@
         </dgm:presLayoutVars>
       </dgm:prSet>
       <dgm:spPr/>
+      <dgm:t>
+        <a:bodyPr/>
+        <a:lstStyle/>
+        <a:p>
+          <a:endParaRPr lang="fr-FR"/>
+        </a:p>
+      </dgm:t>
     </dgm:pt>
     <dgm:pt modelId="{CEED0B74-2FF5-4280-8A58-3C76A9690352}" type="pres">
       <dgm:prSet presAssocID="{890497F4-C114-48C8-8808-773808C4E1AB}" presName="parTransOne" presStyleCnt="0"/>
@@ -2016,6 +2052,13 @@
         </dgm:presLayoutVars>
       </dgm:prSet>
       <dgm:spPr/>
+      <dgm:t>
+        <a:bodyPr/>
+        <a:lstStyle/>
+        <a:p>
+          <a:endParaRPr lang="fr-FR"/>
+        </a:p>
+      </dgm:t>
     </dgm:pt>
     <dgm:pt modelId="{03435225-0B21-4191-91D9-7962269C66BA}" type="pres">
       <dgm:prSet presAssocID="{1D20DBAB-E67B-4048-A34B-E089684BC9AF}" presName="horzTwo" presStyleCnt="0"/>
@@ -2036,6 +2079,13 @@
         </dgm:presLayoutVars>
       </dgm:prSet>
       <dgm:spPr/>
+      <dgm:t>
+        <a:bodyPr/>
+        <a:lstStyle/>
+        <a:p>
+          <a:endParaRPr lang="fr-FR"/>
+        </a:p>
+      </dgm:t>
     </dgm:pt>
     <dgm:pt modelId="{BB103B30-C64B-43D4-AC89-D4EC2C5862C3}" type="pres">
       <dgm:prSet presAssocID="{0674592C-A7DD-440E-B85F-89497DADD703}" presName="horzTwo" presStyleCnt="0"/>
@@ -2056,6 +2106,13 @@
         </dgm:presLayoutVars>
       </dgm:prSet>
       <dgm:spPr/>
+      <dgm:t>
+        <a:bodyPr/>
+        <a:lstStyle/>
+        <a:p>
+          <a:endParaRPr lang="fr-FR"/>
+        </a:p>
+      </dgm:t>
     </dgm:pt>
     <dgm:pt modelId="{F41369E5-01C2-4108-8133-7912B1DC8C1E}" type="pres">
       <dgm:prSet presAssocID="{906E2D92-E0CE-4256-9C1A-E2BDAB6291FE}" presName="horzTwo" presStyleCnt="0"/>
@@ -2550,6 +2607,13 @@
         </dgm:presLayoutVars>
       </dgm:prSet>
       <dgm:spPr/>
+      <dgm:t>
+        <a:bodyPr/>
+        <a:lstStyle/>
+        <a:p>
+          <a:endParaRPr lang="fr-FR"/>
+        </a:p>
+      </dgm:t>
     </dgm:pt>
     <dgm:pt modelId="{27C48641-097B-4DC3-AA2F-5B0BB19CF1DA}" type="pres">
       <dgm:prSet presAssocID="{EF7EAACC-52EE-4140-971E-AFA2D07AA535}" presName="dummyMaxCanvas" presStyleCnt="0">
@@ -2564,6 +2628,13 @@
         </dgm:presLayoutVars>
       </dgm:prSet>
       <dgm:spPr/>
+      <dgm:t>
+        <a:bodyPr/>
+        <a:lstStyle/>
+        <a:p>
+          <a:endParaRPr lang="fr-FR"/>
+        </a:p>
+      </dgm:t>
     </dgm:pt>
     <dgm:pt modelId="{036B55B0-A038-4FD2-BAB1-C0773B0A9693}" type="pres">
       <dgm:prSet presAssocID="{EF7EAACC-52EE-4140-971E-AFA2D07AA535}" presName="ThreeNodes_2" presStyleLbl="node1" presStyleIdx="1" presStyleCnt="3">
@@ -2572,6 +2643,13 @@
         </dgm:presLayoutVars>
       </dgm:prSet>
       <dgm:spPr/>
+      <dgm:t>
+        <a:bodyPr/>
+        <a:lstStyle/>
+        <a:p>
+          <a:endParaRPr lang="fr-FR"/>
+        </a:p>
+      </dgm:t>
     </dgm:pt>
     <dgm:pt modelId="{86EA47AF-B0A1-4283-ADD3-782A8DA08C09}" type="pres">
       <dgm:prSet presAssocID="{EF7EAACC-52EE-4140-971E-AFA2D07AA535}" presName="ThreeNodes_3" presStyleLbl="node1" presStyleIdx="2" presStyleCnt="3">
@@ -2580,6 +2658,13 @@
         </dgm:presLayoutVars>
       </dgm:prSet>
       <dgm:spPr/>
+      <dgm:t>
+        <a:bodyPr/>
+        <a:lstStyle/>
+        <a:p>
+          <a:endParaRPr lang="fr-FR"/>
+        </a:p>
+      </dgm:t>
     </dgm:pt>
     <dgm:pt modelId="{7D119916-EF12-4338-8614-A63632E76FF8}" type="pres">
       <dgm:prSet presAssocID="{EF7EAACC-52EE-4140-971E-AFA2D07AA535}" presName="ThreeConn_1-2" presStyleLbl="fgAccFollowNode1" presStyleIdx="0" presStyleCnt="2">
@@ -2588,6 +2673,13 @@
         </dgm:presLayoutVars>
       </dgm:prSet>
       <dgm:spPr/>
+      <dgm:t>
+        <a:bodyPr/>
+        <a:lstStyle/>
+        <a:p>
+          <a:endParaRPr lang="fr-FR"/>
+        </a:p>
+      </dgm:t>
     </dgm:pt>
     <dgm:pt modelId="{987DD268-9AB4-441B-B3FE-1514A1B8CB54}" type="pres">
       <dgm:prSet presAssocID="{EF7EAACC-52EE-4140-971E-AFA2D07AA535}" presName="ThreeConn_2-3" presStyleLbl="fgAccFollowNode1" presStyleIdx="1" presStyleCnt="2">
@@ -2596,6 +2688,13 @@
         </dgm:presLayoutVars>
       </dgm:prSet>
       <dgm:spPr/>
+      <dgm:t>
+        <a:bodyPr/>
+        <a:lstStyle/>
+        <a:p>
+          <a:endParaRPr lang="fr-FR"/>
+        </a:p>
+      </dgm:t>
     </dgm:pt>
     <dgm:pt modelId="{0883C2C2-AB5C-4B29-BE53-E3F9BBFA0D36}" type="pres">
       <dgm:prSet presAssocID="{EF7EAACC-52EE-4140-971E-AFA2D07AA535}" presName="ThreeNodes_1_text" presStyleLbl="node1" presStyleIdx="2" presStyleCnt="3">
@@ -2604,6 +2703,13 @@
         </dgm:presLayoutVars>
       </dgm:prSet>
       <dgm:spPr/>
+      <dgm:t>
+        <a:bodyPr/>
+        <a:lstStyle/>
+        <a:p>
+          <a:endParaRPr lang="fr-FR"/>
+        </a:p>
+      </dgm:t>
     </dgm:pt>
     <dgm:pt modelId="{CE740956-159E-41BF-B640-A3F4F51E9736}" type="pres">
       <dgm:prSet presAssocID="{EF7EAACC-52EE-4140-971E-AFA2D07AA535}" presName="ThreeNodes_2_text" presStyleLbl="node1" presStyleIdx="2" presStyleCnt="3">
@@ -2612,6 +2718,13 @@
         </dgm:presLayoutVars>
       </dgm:prSet>
       <dgm:spPr/>
+      <dgm:t>
+        <a:bodyPr/>
+        <a:lstStyle/>
+        <a:p>
+          <a:endParaRPr lang="fr-FR"/>
+        </a:p>
+      </dgm:t>
     </dgm:pt>
     <dgm:pt modelId="{EA4FA31D-2E30-463A-878B-1FEF450575CD}" type="pres">
       <dgm:prSet presAssocID="{EF7EAACC-52EE-4140-971E-AFA2D07AA535}" presName="ThreeNodes_3_text" presStyleLbl="node1" presStyleIdx="2" presStyleCnt="3">
@@ -2620,45 +2733,52 @@
         </dgm:presLayoutVars>
       </dgm:prSet>
       <dgm:spPr/>
+      <dgm:t>
+        <a:bodyPr/>
+        <a:lstStyle/>
+        <a:p>
+          <a:endParaRPr lang="fr-FR"/>
+        </a:p>
+      </dgm:t>
     </dgm:pt>
   </dgm:ptLst>
   <dgm:cxnLst>
+    <dgm:cxn modelId="{4D62B472-8B61-4FF3-922B-503EAE360246}" srcId="{EF7EAACC-52EE-4140-971E-AFA2D07AA535}" destId="{38086BD2-697C-484F-97F5-37F5B7BF02B8}" srcOrd="0" destOrd="0" parTransId="{F25818C9-15BC-4494-836F-DCF4D1DCDDD0}" sibTransId="{E43177BE-FC7D-491F-BBAF-467483576AFD}"/>
+    <dgm:cxn modelId="{490BFEF0-FD60-4995-8B83-D1401BEB8FDC}" type="presOf" srcId="{5029DC07-4C16-4F69-9CDF-96E95B20232E}" destId="{CE740956-159E-41BF-B640-A3F4F51E9736}" srcOrd="1" destOrd="0" presId="urn:microsoft.com/office/officeart/2005/8/layout/vProcess5"/>
+    <dgm:cxn modelId="{20C4AC38-D6DE-48B0-BEBC-3610C114E659}" type="presOf" srcId="{E43177BE-FC7D-491F-BBAF-467483576AFD}" destId="{7D119916-EF12-4338-8614-A63632E76FF8}" srcOrd="0" destOrd="0" presId="urn:microsoft.com/office/officeart/2005/8/layout/vProcess5"/>
+    <dgm:cxn modelId="{28535230-B4B8-4DAF-A837-70D2DA0F4361}" type="presOf" srcId="{5029DC07-4C16-4F69-9CDF-96E95B20232E}" destId="{036B55B0-A038-4FD2-BAB1-C0773B0A9693}" srcOrd="0" destOrd="0" presId="urn:microsoft.com/office/officeart/2005/8/layout/vProcess5"/>
+    <dgm:cxn modelId="{C220D1BF-038B-441E-BA6B-A35A38D827C7}" srcId="{EF7EAACC-52EE-4140-971E-AFA2D07AA535}" destId="{FC18C847-CC4E-449C-A4E2-86ACEF2F8C34}" srcOrd="2" destOrd="0" parTransId="{75DBA160-13F2-4F9A-B9A0-383F7F483268}" sibTransId="{1FE8CB61-4B88-416E-A478-D7484B4FB3C1}"/>
+    <dgm:cxn modelId="{8125129E-D1BB-4C5F-9E88-3946FA392118}" type="presOf" srcId="{AB52D7FE-FFC3-43FD-9EF8-E433F1D706C2}" destId="{86EA47AF-B0A1-4283-ADD3-782A8DA08C09}" srcOrd="0" destOrd="3" presId="urn:microsoft.com/office/officeart/2005/8/layout/vProcess5"/>
+    <dgm:cxn modelId="{37EA1A10-BAAA-45C9-99A1-F70EFB5F389C}" srcId="{FC18C847-CC4E-449C-A4E2-86ACEF2F8C34}" destId="{F2B32B3E-275B-466E-891F-2CED05CD082B}" srcOrd="1" destOrd="0" parTransId="{D09B9187-6912-433B-A7BD-24631C754320}" sibTransId="{C29F239C-4B34-4FB9-B884-216C20CB3E0F}"/>
+    <dgm:cxn modelId="{CFBB9F64-0B7D-46E2-BABD-1505EB566599}" type="presOf" srcId="{EF7EAACC-52EE-4140-971E-AFA2D07AA535}" destId="{C01C9584-6A20-4EE9-ACD7-D5F8C9DBDE3F}" srcOrd="0" destOrd="0" presId="urn:microsoft.com/office/officeart/2005/8/layout/vProcess5"/>
+    <dgm:cxn modelId="{CDFFB4E0-F04B-4088-860A-EBFB5569345F}" type="presOf" srcId="{8DBEF747-B0F2-4BB4-9B6E-44CF7C366BA5}" destId="{CE740956-159E-41BF-B640-A3F4F51E9736}" srcOrd="1" destOrd="3" presId="urn:microsoft.com/office/officeart/2005/8/layout/vProcess5"/>
+    <dgm:cxn modelId="{4EEBA1F8-D3EF-4139-8D5D-C8AFEC2CD4A1}" srcId="{38086BD2-697C-484F-97F5-37F5B7BF02B8}" destId="{858EE25A-3776-41A8-B4DE-F6966813872B}" srcOrd="0" destOrd="0" parTransId="{4C1B12AF-7CC5-47B2-A8FC-CC72F26A45DF}" sibTransId="{13605B48-3C4A-497F-852C-2E40B2B2F108}"/>
+    <dgm:cxn modelId="{022167CC-E51A-41C4-99D4-DAFC5CE5CA4B}" type="presOf" srcId="{DB8D3006-C519-478F-A249-D235C420EC99}" destId="{CE740956-159E-41BF-B640-A3F4F51E9736}" srcOrd="1" destOrd="2" presId="urn:microsoft.com/office/officeart/2005/8/layout/vProcess5"/>
+    <dgm:cxn modelId="{4FFD47B7-0066-4606-B9CC-28C84A728104}" type="presOf" srcId="{DB8D3006-C519-478F-A249-D235C420EC99}" destId="{036B55B0-A038-4FD2-BAB1-C0773B0A9693}" srcOrd="0" destOrd="2" presId="urn:microsoft.com/office/officeart/2005/8/layout/vProcess5"/>
+    <dgm:cxn modelId="{0D1AE267-EB9E-4BFF-8282-5909D55A0004}" type="presOf" srcId="{FC18C847-CC4E-449C-A4E2-86ACEF2F8C34}" destId="{EA4FA31D-2E30-463A-878B-1FEF450575CD}" srcOrd="1" destOrd="0" presId="urn:microsoft.com/office/officeart/2005/8/layout/vProcess5"/>
+    <dgm:cxn modelId="{D4E16DBD-18FB-4282-9C6C-EC944528A465}" type="presOf" srcId="{F2B32B3E-275B-466E-891F-2CED05CD082B}" destId="{EA4FA31D-2E30-463A-878B-1FEF450575CD}" srcOrd="1" destOrd="2" presId="urn:microsoft.com/office/officeart/2005/8/layout/vProcess5"/>
+    <dgm:cxn modelId="{DC53F504-30CC-490E-BD74-C7B85AC58DFC}" type="presOf" srcId="{4122F697-3A3F-42B2-B081-C2F3C94FDAC1}" destId="{036B55B0-A038-4FD2-BAB1-C0773B0A9693}" srcOrd="0" destOrd="1" presId="urn:microsoft.com/office/officeart/2005/8/layout/vProcess5"/>
+    <dgm:cxn modelId="{65414BC5-1D97-42B2-8B3F-397FA2374C28}" type="presOf" srcId="{D94EB831-6EF8-4002-A565-990279BFDBED}" destId="{EA4FA31D-2E30-463A-878B-1FEF450575CD}" srcOrd="1" destOrd="1" presId="urn:microsoft.com/office/officeart/2005/8/layout/vProcess5"/>
+    <dgm:cxn modelId="{BE3E6069-12C7-42E4-9723-2923741C300C}" type="presOf" srcId="{751228FD-ABC6-4E0A-BDB3-388C27E81E0A}" destId="{A79932B1-3215-4647-83FF-466F12BB0D7A}" srcOrd="0" destOrd="2" presId="urn:microsoft.com/office/officeart/2005/8/layout/vProcess5"/>
+    <dgm:cxn modelId="{7ECE1923-9044-4B02-9510-C35D9175F89E}" type="presOf" srcId="{4122F697-3A3F-42B2-B081-C2F3C94FDAC1}" destId="{CE740956-159E-41BF-B640-A3F4F51E9736}" srcOrd="1" destOrd="1" presId="urn:microsoft.com/office/officeart/2005/8/layout/vProcess5"/>
+    <dgm:cxn modelId="{0174D5BC-DC08-441D-B88F-256C8A9DBB0B}" type="presOf" srcId="{8DBEF747-B0F2-4BB4-9B6E-44CF7C366BA5}" destId="{036B55B0-A038-4FD2-BAB1-C0773B0A9693}" srcOrd="0" destOrd="3" presId="urn:microsoft.com/office/officeart/2005/8/layout/vProcess5"/>
+    <dgm:cxn modelId="{11FE6543-4B02-4AA7-83B1-96A20C7AC22F}" type="presOf" srcId="{751228FD-ABC6-4E0A-BDB3-388C27E81E0A}" destId="{0883C2C2-AB5C-4B29-BE53-E3F9BBFA0D36}" srcOrd="1" destOrd="2" presId="urn:microsoft.com/office/officeart/2005/8/layout/vProcess5"/>
+    <dgm:cxn modelId="{9688133F-2EBF-425F-865C-3FF808195901}" type="presOf" srcId="{858EE25A-3776-41A8-B4DE-F6966813872B}" destId="{A79932B1-3215-4647-83FF-466F12BB0D7A}" srcOrd="0" destOrd="1" presId="urn:microsoft.com/office/officeart/2005/8/layout/vProcess5"/>
+    <dgm:cxn modelId="{99B21832-15EA-494C-8778-293F7B9A0169}" srcId="{EF7EAACC-52EE-4140-971E-AFA2D07AA535}" destId="{5029DC07-4C16-4F69-9CDF-96E95B20232E}" srcOrd="1" destOrd="0" parTransId="{63C1E885-B2EB-4AFD-B3A1-AD2D9D42C5E3}" sibTransId="{47CD49EF-9EEF-4498-BE72-83C40DAA6415}"/>
     <dgm:cxn modelId="{9F427840-29AE-450A-B9E8-06B3E3BF4D52}" srcId="{FC18C847-CC4E-449C-A4E2-86ACEF2F8C34}" destId="{D94EB831-6EF8-4002-A565-990279BFDBED}" srcOrd="0" destOrd="0" parTransId="{3FC48DE0-DB19-4252-B804-33278B00879B}" sibTransId="{EB42472C-5B5C-47AC-9187-B98F121F2A23}"/>
-    <dgm:cxn modelId="{8125129E-D1BB-4C5F-9E88-3946FA392118}" type="presOf" srcId="{AB52D7FE-FFC3-43FD-9EF8-E433F1D706C2}" destId="{86EA47AF-B0A1-4283-ADD3-782A8DA08C09}" srcOrd="0" destOrd="3" presId="urn:microsoft.com/office/officeart/2005/8/layout/vProcess5"/>
-    <dgm:cxn modelId="{022167CC-E51A-41C4-99D4-DAFC5CE5CA4B}" type="presOf" srcId="{DB8D3006-C519-478F-A249-D235C420EC99}" destId="{CE740956-159E-41BF-B640-A3F4F51E9736}" srcOrd="1" destOrd="2" presId="urn:microsoft.com/office/officeart/2005/8/layout/vProcess5"/>
+    <dgm:cxn modelId="{B1D3D4F7-2935-41F4-A35F-B8600215A758}" type="presOf" srcId="{858EE25A-3776-41A8-B4DE-F6966813872B}" destId="{0883C2C2-AB5C-4B29-BE53-E3F9BBFA0D36}" srcOrd="1" destOrd="1" presId="urn:microsoft.com/office/officeart/2005/8/layout/vProcess5"/>
+    <dgm:cxn modelId="{E358CCF5-9FB5-40BB-AA60-FFEBEE4D07A7}" srcId="{5029DC07-4C16-4F69-9CDF-96E95B20232E}" destId="{4122F697-3A3F-42B2-B081-C2F3C94FDAC1}" srcOrd="0" destOrd="0" parTransId="{21A63BB6-44D4-4C6F-983F-FB35F16B19F6}" sibTransId="{6C2B4356-23FA-4ED4-B40D-2640A3CFDE91}"/>
+    <dgm:cxn modelId="{E677BB03-2795-4235-ABE3-4B78F8D4F06E}" srcId="{5029DC07-4C16-4F69-9CDF-96E95B20232E}" destId="{DB8D3006-C519-478F-A249-D235C420EC99}" srcOrd="1" destOrd="0" parTransId="{A95DD84C-E330-4E56-B910-1C9BA8A13750}" sibTransId="{48B4C2DB-BF3F-4270-B310-004E72BD9C3C}"/>
+    <dgm:cxn modelId="{BA6974BB-D2C8-4E59-871B-889F299D1ECA}" srcId="{5029DC07-4C16-4F69-9CDF-96E95B20232E}" destId="{8DBEF747-B0F2-4BB4-9B6E-44CF7C366BA5}" srcOrd="2" destOrd="0" parTransId="{3E9142B5-7874-49C3-B557-AE4B91666DF7}" sibTransId="{79671861-8F3D-45E0-A1A0-1F1D40360CB4}"/>
+    <dgm:cxn modelId="{F65E1CF0-0770-4C03-82DA-2B870D0AF2CA}" type="presOf" srcId="{38086BD2-697C-484F-97F5-37F5B7BF02B8}" destId="{0883C2C2-AB5C-4B29-BE53-E3F9BBFA0D36}" srcOrd="1" destOrd="0" presId="urn:microsoft.com/office/officeart/2005/8/layout/vProcess5"/>
+    <dgm:cxn modelId="{CE38446F-C318-4E49-9E38-4DDD41923A49}" srcId="{FC18C847-CC4E-449C-A4E2-86ACEF2F8C34}" destId="{AB52D7FE-FFC3-43FD-9EF8-E433F1D706C2}" srcOrd="2" destOrd="0" parTransId="{2ACBCF45-4106-4D00-8521-0193B48727E0}" sibTransId="{FE4A7124-B564-4BE4-99A2-7B8248277768}"/>
+    <dgm:cxn modelId="{7EFAF790-9258-4F16-8473-C0FF63453A47}" type="presOf" srcId="{47CD49EF-9EEF-4498-BE72-83C40DAA6415}" destId="{987DD268-9AB4-441B-B3FE-1514A1B8CB54}" srcOrd="0" destOrd="0" presId="urn:microsoft.com/office/officeart/2005/8/layout/vProcess5"/>
+    <dgm:cxn modelId="{4A3D5B20-4DF7-4CC8-B80F-2B651D71E2F1}" type="presOf" srcId="{AB52D7FE-FFC3-43FD-9EF8-E433F1D706C2}" destId="{EA4FA31D-2E30-463A-878B-1FEF450575CD}" srcOrd="1" destOrd="3" presId="urn:microsoft.com/office/officeart/2005/8/layout/vProcess5"/>
+    <dgm:cxn modelId="{42B8887F-1217-4C46-980E-5E0ACD9B99B6}" srcId="{38086BD2-697C-484F-97F5-37F5B7BF02B8}" destId="{751228FD-ABC6-4E0A-BDB3-388C27E81E0A}" srcOrd="1" destOrd="0" parTransId="{F415ED72-0A89-42BF-B83D-FD2EC32937FB}" sibTransId="{BC2E6030-28D6-4C16-B307-25FFBE676125}"/>
+    <dgm:cxn modelId="{ABFC140C-EC85-4AB7-9A7B-B67B4CCB5AC7}" type="presOf" srcId="{D94EB831-6EF8-4002-A565-990279BFDBED}" destId="{86EA47AF-B0A1-4283-ADD3-782A8DA08C09}" srcOrd="0" destOrd="1" presId="urn:microsoft.com/office/officeart/2005/8/layout/vProcess5"/>
     <dgm:cxn modelId="{FD3DFE45-A2EC-43FC-881F-79492E2FEFFD}" type="presOf" srcId="{38086BD2-697C-484F-97F5-37F5B7BF02B8}" destId="{A79932B1-3215-4647-83FF-466F12BB0D7A}" srcOrd="0" destOrd="0" presId="urn:microsoft.com/office/officeart/2005/8/layout/vProcess5"/>
-    <dgm:cxn modelId="{F65E1CF0-0770-4C03-82DA-2B870D0AF2CA}" type="presOf" srcId="{38086BD2-697C-484F-97F5-37F5B7BF02B8}" destId="{0883C2C2-AB5C-4B29-BE53-E3F9BBFA0D36}" srcOrd="1" destOrd="0" presId="urn:microsoft.com/office/officeart/2005/8/layout/vProcess5"/>
-    <dgm:cxn modelId="{28535230-B4B8-4DAF-A837-70D2DA0F4361}" type="presOf" srcId="{5029DC07-4C16-4F69-9CDF-96E95B20232E}" destId="{036B55B0-A038-4FD2-BAB1-C0773B0A9693}" srcOrd="0" destOrd="0" presId="urn:microsoft.com/office/officeart/2005/8/layout/vProcess5"/>
-    <dgm:cxn modelId="{7ECE1923-9044-4B02-9510-C35D9175F89E}" type="presOf" srcId="{4122F697-3A3F-42B2-B081-C2F3C94FDAC1}" destId="{CE740956-159E-41BF-B640-A3F4F51E9736}" srcOrd="1" destOrd="1" presId="urn:microsoft.com/office/officeart/2005/8/layout/vProcess5"/>
-    <dgm:cxn modelId="{9688133F-2EBF-425F-865C-3FF808195901}" type="presOf" srcId="{858EE25A-3776-41A8-B4DE-F6966813872B}" destId="{A79932B1-3215-4647-83FF-466F12BB0D7A}" srcOrd="0" destOrd="1" presId="urn:microsoft.com/office/officeart/2005/8/layout/vProcess5"/>
-    <dgm:cxn modelId="{B1D3D4F7-2935-41F4-A35F-B8600215A758}" type="presOf" srcId="{858EE25A-3776-41A8-B4DE-F6966813872B}" destId="{0883C2C2-AB5C-4B29-BE53-E3F9BBFA0D36}" srcOrd="1" destOrd="1" presId="urn:microsoft.com/office/officeart/2005/8/layout/vProcess5"/>
-    <dgm:cxn modelId="{20C4AC38-D6DE-48B0-BEBC-3610C114E659}" type="presOf" srcId="{E43177BE-FC7D-491F-BBAF-467483576AFD}" destId="{7D119916-EF12-4338-8614-A63632E76FF8}" srcOrd="0" destOrd="0" presId="urn:microsoft.com/office/officeart/2005/8/layout/vProcess5"/>
     <dgm:cxn modelId="{D11E5BA1-B20B-425C-8810-326D82AC6209}" type="presOf" srcId="{F2B32B3E-275B-466E-891F-2CED05CD082B}" destId="{86EA47AF-B0A1-4283-ADD3-782A8DA08C09}" srcOrd="0" destOrd="2" presId="urn:microsoft.com/office/officeart/2005/8/layout/vProcess5"/>
-    <dgm:cxn modelId="{99B21832-15EA-494C-8778-293F7B9A0169}" srcId="{EF7EAACC-52EE-4140-971E-AFA2D07AA535}" destId="{5029DC07-4C16-4F69-9CDF-96E95B20232E}" srcOrd="1" destOrd="0" parTransId="{63C1E885-B2EB-4AFD-B3A1-AD2D9D42C5E3}" sibTransId="{47CD49EF-9EEF-4498-BE72-83C40DAA6415}"/>
-    <dgm:cxn modelId="{7EFAF790-9258-4F16-8473-C0FF63453A47}" type="presOf" srcId="{47CD49EF-9EEF-4498-BE72-83C40DAA6415}" destId="{987DD268-9AB4-441B-B3FE-1514A1B8CB54}" srcOrd="0" destOrd="0" presId="urn:microsoft.com/office/officeart/2005/8/layout/vProcess5"/>
-    <dgm:cxn modelId="{4EEBA1F8-D3EF-4139-8D5D-C8AFEC2CD4A1}" srcId="{38086BD2-697C-484F-97F5-37F5B7BF02B8}" destId="{858EE25A-3776-41A8-B4DE-F6966813872B}" srcOrd="0" destOrd="0" parTransId="{4C1B12AF-7CC5-47B2-A8FC-CC72F26A45DF}" sibTransId="{13605B48-3C4A-497F-852C-2E40B2B2F108}"/>
-    <dgm:cxn modelId="{11FE6543-4B02-4AA7-83B1-96A20C7AC22F}" type="presOf" srcId="{751228FD-ABC6-4E0A-BDB3-388C27E81E0A}" destId="{0883C2C2-AB5C-4B29-BE53-E3F9BBFA0D36}" srcOrd="1" destOrd="2" presId="urn:microsoft.com/office/officeart/2005/8/layout/vProcess5"/>
-    <dgm:cxn modelId="{CDFFB4E0-F04B-4088-860A-EBFB5569345F}" type="presOf" srcId="{8DBEF747-B0F2-4BB4-9B6E-44CF7C366BA5}" destId="{CE740956-159E-41BF-B640-A3F4F51E9736}" srcOrd="1" destOrd="3" presId="urn:microsoft.com/office/officeart/2005/8/layout/vProcess5"/>
-    <dgm:cxn modelId="{CFBB9F64-0B7D-46E2-BABD-1505EB566599}" type="presOf" srcId="{EF7EAACC-52EE-4140-971E-AFA2D07AA535}" destId="{C01C9584-6A20-4EE9-ACD7-D5F8C9DBDE3F}" srcOrd="0" destOrd="0" presId="urn:microsoft.com/office/officeart/2005/8/layout/vProcess5"/>
-    <dgm:cxn modelId="{0174D5BC-DC08-441D-B88F-256C8A9DBB0B}" type="presOf" srcId="{8DBEF747-B0F2-4BB4-9B6E-44CF7C366BA5}" destId="{036B55B0-A038-4FD2-BAB1-C0773B0A9693}" srcOrd="0" destOrd="3" presId="urn:microsoft.com/office/officeart/2005/8/layout/vProcess5"/>
-    <dgm:cxn modelId="{4D62B472-8B61-4FF3-922B-503EAE360246}" srcId="{EF7EAACC-52EE-4140-971E-AFA2D07AA535}" destId="{38086BD2-697C-484F-97F5-37F5B7BF02B8}" srcOrd="0" destOrd="0" parTransId="{F25818C9-15BC-4494-836F-DCF4D1DCDDD0}" sibTransId="{E43177BE-FC7D-491F-BBAF-467483576AFD}"/>
     <dgm:cxn modelId="{7BF9ECAA-C56E-418D-BF46-C5F4553B549E}" type="presOf" srcId="{FC18C847-CC4E-449C-A4E2-86ACEF2F8C34}" destId="{86EA47AF-B0A1-4283-ADD3-782A8DA08C09}" srcOrd="0" destOrd="0" presId="urn:microsoft.com/office/officeart/2005/8/layout/vProcess5"/>
-    <dgm:cxn modelId="{0D1AE267-EB9E-4BFF-8282-5909D55A0004}" type="presOf" srcId="{FC18C847-CC4E-449C-A4E2-86ACEF2F8C34}" destId="{EA4FA31D-2E30-463A-878B-1FEF450575CD}" srcOrd="1" destOrd="0" presId="urn:microsoft.com/office/officeart/2005/8/layout/vProcess5"/>
-    <dgm:cxn modelId="{DC53F504-30CC-490E-BD74-C7B85AC58DFC}" type="presOf" srcId="{4122F697-3A3F-42B2-B081-C2F3C94FDAC1}" destId="{036B55B0-A038-4FD2-BAB1-C0773B0A9693}" srcOrd="0" destOrd="1" presId="urn:microsoft.com/office/officeart/2005/8/layout/vProcess5"/>
-    <dgm:cxn modelId="{E358CCF5-9FB5-40BB-AA60-FFEBEE4D07A7}" srcId="{5029DC07-4C16-4F69-9CDF-96E95B20232E}" destId="{4122F697-3A3F-42B2-B081-C2F3C94FDAC1}" srcOrd="0" destOrd="0" parTransId="{21A63BB6-44D4-4C6F-983F-FB35F16B19F6}" sibTransId="{6C2B4356-23FA-4ED4-B40D-2640A3CFDE91}"/>
-    <dgm:cxn modelId="{42B8887F-1217-4C46-980E-5E0ACD9B99B6}" srcId="{38086BD2-697C-484F-97F5-37F5B7BF02B8}" destId="{751228FD-ABC6-4E0A-BDB3-388C27E81E0A}" srcOrd="1" destOrd="0" parTransId="{F415ED72-0A89-42BF-B83D-FD2EC32937FB}" sibTransId="{BC2E6030-28D6-4C16-B307-25FFBE676125}"/>
-    <dgm:cxn modelId="{4A3D5B20-4DF7-4CC8-B80F-2B651D71E2F1}" type="presOf" srcId="{AB52D7FE-FFC3-43FD-9EF8-E433F1D706C2}" destId="{EA4FA31D-2E30-463A-878B-1FEF450575CD}" srcOrd="1" destOrd="3" presId="urn:microsoft.com/office/officeart/2005/8/layout/vProcess5"/>
-    <dgm:cxn modelId="{4FFD47B7-0066-4606-B9CC-28C84A728104}" type="presOf" srcId="{DB8D3006-C519-478F-A249-D235C420EC99}" destId="{036B55B0-A038-4FD2-BAB1-C0773B0A9693}" srcOrd="0" destOrd="2" presId="urn:microsoft.com/office/officeart/2005/8/layout/vProcess5"/>
-    <dgm:cxn modelId="{65414BC5-1D97-42B2-8B3F-397FA2374C28}" type="presOf" srcId="{D94EB831-6EF8-4002-A565-990279BFDBED}" destId="{EA4FA31D-2E30-463A-878B-1FEF450575CD}" srcOrd="1" destOrd="1" presId="urn:microsoft.com/office/officeart/2005/8/layout/vProcess5"/>
-    <dgm:cxn modelId="{D4E16DBD-18FB-4282-9C6C-EC944528A465}" type="presOf" srcId="{F2B32B3E-275B-466E-891F-2CED05CD082B}" destId="{EA4FA31D-2E30-463A-878B-1FEF450575CD}" srcOrd="1" destOrd="2" presId="urn:microsoft.com/office/officeart/2005/8/layout/vProcess5"/>
-    <dgm:cxn modelId="{37EA1A10-BAAA-45C9-99A1-F70EFB5F389C}" srcId="{FC18C847-CC4E-449C-A4E2-86ACEF2F8C34}" destId="{F2B32B3E-275B-466E-891F-2CED05CD082B}" srcOrd="1" destOrd="0" parTransId="{D09B9187-6912-433B-A7BD-24631C754320}" sibTransId="{C29F239C-4B34-4FB9-B884-216C20CB3E0F}"/>
-    <dgm:cxn modelId="{490BFEF0-FD60-4995-8B83-D1401BEB8FDC}" type="presOf" srcId="{5029DC07-4C16-4F69-9CDF-96E95B20232E}" destId="{CE740956-159E-41BF-B640-A3F4F51E9736}" srcOrd="1" destOrd="0" presId="urn:microsoft.com/office/officeart/2005/8/layout/vProcess5"/>
-    <dgm:cxn modelId="{BA6974BB-D2C8-4E59-871B-889F299D1ECA}" srcId="{5029DC07-4C16-4F69-9CDF-96E95B20232E}" destId="{8DBEF747-B0F2-4BB4-9B6E-44CF7C366BA5}" srcOrd="2" destOrd="0" parTransId="{3E9142B5-7874-49C3-B557-AE4B91666DF7}" sibTransId="{79671861-8F3D-45E0-A1A0-1F1D40360CB4}"/>
-    <dgm:cxn modelId="{CE38446F-C318-4E49-9E38-4DDD41923A49}" srcId="{FC18C847-CC4E-449C-A4E2-86ACEF2F8C34}" destId="{AB52D7FE-FFC3-43FD-9EF8-E433F1D706C2}" srcOrd="2" destOrd="0" parTransId="{2ACBCF45-4106-4D00-8521-0193B48727E0}" sibTransId="{FE4A7124-B564-4BE4-99A2-7B8248277768}"/>
-    <dgm:cxn modelId="{C220D1BF-038B-441E-BA6B-A35A38D827C7}" srcId="{EF7EAACC-52EE-4140-971E-AFA2D07AA535}" destId="{FC18C847-CC4E-449C-A4E2-86ACEF2F8C34}" srcOrd="2" destOrd="0" parTransId="{75DBA160-13F2-4F9A-B9A0-383F7F483268}" sibTransId="{1FE8CB61-4B88-416E-A478-D7484B4FB3C1}"/>
-    <dgm:cxn modelId="{BE3E6069-12C7-42E4-9723-2923741C300C}" type="presOf" srcId="{751228FD-ABC6-4E0A-BDB3-388C27E81E0A}" destId="{A79932B1-3215-4647-83FF-466F12BB0D7A}" srcOrd="0" destOrd="2" presId="urn:microsoft.com/office/officeart/2005/8/layout/vProcess5"/>
-    <dgm:cxn modelId="{E677BB03-2795-4235-ABE3-4B78F8D4F06E}" srcId="{5029DC07-4C16-4F69-9CDF-96E95B20232E}" destId="{DB8D3006-C519-478F-A249-D235C420EC99}" srcOrd="1" destOrd="0" parTransId="{A95DD84C-E330-4E56-B910-1C9BA8A13750}" sibTransId="{48B4C2DB-BF3F-4270-B310-004E72BD9C3C}"/>
-    <dgm:cxn modelId="{ABFC140C-EC85-4AB7-9A7B-B67B4CCB5AC7}" type="presOf" srcId="{D94EB831-6EF8-4002-A565-990279BFDBED}" destId="{86EA47AF-B0A1-4283-ADD3-782A8DA08C09}" srcOrd="0" destOrd="1" presId="urn:microsoft.com/office/officeart/2005/8/layout/vProcess5"/>
     <dgm:cxn modelId="{550EE9CD-FB41-431C-A9B4-8106FBEC613E}" type="presParOf" srcId="{C01C9584-6A20-4EE9-ACD7-D5F8C9DBDE3F}" destId="{27C48641-097B-4DC3-AA2F-5B0BB19CF1DA}" srcOrd="0" destOrd="0" presId="urn:microsoft.com/office/officeart/2005/8/layout/vProcess5"/>
     <dgm:cxn modelId="{C8631932-000A-44C6-8E4E-216AD57CB42E}" type="presParOf" srcId="{C01C9584-6A20-4EE9-ACD7-D5F8C9DBDE3F}" destId="{A79932B1-3215-4647-83FF-466F12BB0D7A}" srcOrd="1" destOrd="0" presId="urn:microsoft.com/office/officeart/2005/8/layout/vProcess5"/>
     <dgm:cxn modelId="{D35917D5-8C87-49B8-8C4D-449C0EF30F81}" type="presParOf" srcId="{C01C9584-6A20-4EE9-ACD7-D5F8C9DBDE3F}" destId="{036B55B0-A038-4FD2-BAB1-C0773B0A9693}" srcOrd="2" destOrd="0" presId="urn:microsoft.com/office/officeart/2005/8/layout/vProcess5"/>
@@ -7724,7 +7844,7 @@
             <a:fld id="{B1FE0BAB-EB1C-40EA-B1E2-7035A3D6F2BC}" type="datetimeFigureOut">
               <a:rPr lang="fr-FR" smtClean="0"/>
               <a:pPr/>
-              <a:t>05/03/2015</a:t>
+              <a:t>08/03/2015</a:t>
             </a:fld>
             <a:endParaRPr lang="fr-FR"/>
           </a:p>
@@ -10396,7 +10516,7 @@
             <a:fld id="{ACDF6120-F1F0-4C60-9FE9-39AC71A9C79D}" type="datetimeFigureOut">
               <a:rPr lang="en-US" smtClean="0"/>
               <a:pPr/>
-              <a:t>3/5/2015</a:t>
+              <a:t>3/8/2015</a:t>
             </a:fld>
             <a:endParaRPr lang="en-US" sz="1600" dirty="0"/>
           </a:p>
@@ -10594,7 +10714,7 @@
             <a:fld id="{ACDF6120-F1F0-4C60-9FE9-39AC71A9C79D}" type="datetimeFigureOut">
               <a:rPr lang="en-US" smtClean="0"/>
               <a:pPr/>
-              <a:t>3/5/2015</a:t>
+              <a:t>3/8/2015</a:t>
             </a:fld>
             <a:endParaRPr lang="en-US"/>
           </a:p>
@@ -10781,7 +10901,7 @@
             <a:fld id="{ACDF6120-F1F0-4C60-9FE9-39AC71A9C79D}" type="datetimeFigureOut">
               <a:rPr lang="en-US" smtClean="0"/>
               <a:pPr/>
-              <a:t>3/5/2015</a:t>
+              <a:t>3/8/2015</a:t>
             </a:fld>
             <a:endParaRPr lang="en-US"/>
           </a:p>
@@ -10933,7 +11053,7 @@
             <a:fld id="{ACDF6120-F1F0-4C60-9FE9-39AC71A9C79D}" type="datetimeFigureOut">
               <a:rPr lang="en-US" smtClean="0"/>
               <a:pPr/>
-              <a:t>3/5/2015</a:t>
+              <a:t>3/8/2015</a:t>
             </a:fld>
             <a:endParaRPr lang="en-US" dirty="0"/>
           </a:p>
@@ -11190,7 +11310,7 @@
             <a:fld id="{ACDF6120-F1F0-4C60-9FE9-39AC71A9C79D}" type="datetimeFigureOut">
               <a:rPr lang="en-US" smtClean="0"/>
               <a:pPr/>
-              <a:t>3/5/2015</a:t>
+              <a:t>3/8/2015</a:t>
             </a:fld>
             <a:endParaRPr lang="en-US" dirty="0"/>
           </a:p>
@@ -11601,7 +11721,7 @@
             <a:fld id="{ACDF6120-F1F0-4C60-9FE9-39AC71A9C79D}" type="datetimeFigureOut">
               <a:rPr lang="en-US" smtClean="0"/>
               <a:pPr/>
-              <a:t>3/5/2015</a:t>
+              <a:t>3/8/2015</a:t>
             </a:fld>
             <a:endParaRPr lang="en-US"/>
           </a:p>
@@ -12049,7 +12169,7 @@
             <a:fld id="{ACDF6120-F1F0-4C60-9FE9-39AC71A9C79D}" type="datetimeFigureOut">
               <a:rPr lang="en-US" smtClean="0"/>
               <a:pPr/>
-              <a:t>3/5/2015</a:t>
+              <a:t>3/8/2015</a:t>
             </a:fld>
             <a:endParaRPr lang="en-US"/>
           </a:p>
@@ -12152,7 +12272,7 @@
             <a:fld id="{ACDF6120-F1F0-4C60-9FE9-39AC71A9C79D}" type="datetimeFigureOut">
               <a:rPr lang="en-US" smtClean="0"/>
               <a:pPr/>
-              <a:t>3/5/2015</a:t>
+              <a:t>3/8/2015</a:t>
             </a:fld>
             <a:endParaRPr lang="en-US"/>
           </a:p>
@@ -12275,7 +12395,7 @@
             <a:fld id="{ACDF6120-F1F0-4C60-9FE9-39AC71A9C79D}" type="datetimeFigureOut">
               <a:rPr lang="en-US" smtClean="0"/>
               <a:pPr/>
-              <a:t>3/5/2015</a:t>
+              <a:t>3/8/2015</a:t>
             </a:fld>
             <a:endParaRPr lang="en-US"/>
           </a:p>
@@ -12551,7 +12671,7 @@
             <a:fld id="{ACDF6120-F1F0-4C60-9FE9-39AC71A9C79D}" type="datetimeFigureOut">
               <a:rPr lang="en-US" smtClean="0"/>
               <a:pPr/>
-              <a:t>3/5/2015</a:t>
+              <a:t>3/8/2015</a:t>
             </a:fld>
             <a:endParaRPr lang="en-US"/>
           </a:p>
@@ -12758,7 +12878,7 @@
             <a:fld id="{ACDF6120-F1F0-4C60-9FE9-39AC71A9C79D}" type="datetimeFigureOut">
               <a:rPr lang="en-US" smtClean="0"/>
               <a:pPr/>
-              <a:t>3/5/2015</a:t>
+              <a:t>3/8/2015</a:t>
             </a:fld>
             <a:endParaRPr lang="en-US"/>
           </a:p>
@@ -13869,7 +13989,7 @@
             <a:fld id="{ACDF6120-F1F0-4C60-9FE9-39AC71A9C79D}" type="datetimeFigureOut">
               <a:rPr lang="en-US" smtClean="0"/>
               <a:pPr/>
-              <a:t>3/5/2015</a:t>
+              <a:t>3/8/2015</a:t>
             </a:fld>
             <a:endParaRPr lang="en-US" sz="1400" dirty="0">
               <a:solidFill>
@@ -16547,6 +16667,112 @@
 </p:sld>
 </file>
 
+<file path=ppt/slides/slide18.xml><?xml version="1.0" encoding="utf-8"?>
+<p:sld xmlns:a="http://schemas.openxmlformats.org/drawingml/2006/main" xmlns:r="http://schemas.openxmlformats.org/officeDocument/2006/relationships" xmlns:p="http://schemas.openxmlformats.org/presentationml/2006/main">
+  <p:cSld>
+    <p:spTree>
+      <p:nvGrpSpPr>
+        <p:cNvPr id="1" name=""/>
+        <p:cNvGrpSpPr/>
+        <p:nvPr/>
+      </p:nvGrpSpPr>
+      <p:grpSpPr>
+        <a:xfrm>
+          <a:off x="0" y="0"/>
+          <a:ext cx="0" cy="0"/>
+          <a:chOff x="0" y="0"/>
+          <a:chExt cx="0" cy="0"/>
+        </a:xfrm>
+      </p:grpSpPr>
+      <p:sp>
+        <p:nvSpPr>
+          <p:cNvPr id="3" name="Titre 2"/>
+          <p:cNvSpPr>
+            <a:spLocks noGrp="1"/>
+          </p:cNvSpPr>
+          <p:nvPr>
+            <p:ph type="title"/>
+          </p:nvPr>
+        </p:nvSpPr>
+        <p:spPr>
+          <a:xfrm>
+            <a:off x="467544" y="2060848"/>
+            <a:ext cx="8229600" cy="1143000"/>
+          </a:xfrm>
+        </p:spPr>
+        <p:txBody>
+          <a:bodyPr/>
+          <a:lstStyle/>
+          <a:p>
+            <a:pPr algn="ctr"/>
+            <a:r>
+              <a:rPr lang="fr-FR" dirty="0" smtClean="0"/>
+              <a:t>Questions / réponses</a:t>
+            </a:r>
+            <a:endParaRPr lang="fr-FR" dirty="0"/>
+          </a:p>
+        </p:txBody>
+      </p:sp>
+      <p:pic>
+        <p:nvPicPr>
+          <p:cNvPr id="4" name="Image 3" descr="logo_cci.gif"/>
+          <p:cNvPicPr/>
+          <p:nvPr/>
+        </p:nvPicPr>
+        <p:blipFill>
+          <a:blip r:embed="rId2" cstate="print"/>
+          <a:stretch>
+            <a:fillRect/>
+          </a:stretch>
+        </p:blipFill>
+        <p:spPr>
+          <a:xfrm>
+            <a:off x="7740352" y="188640"/>
+            <a:ext cx="1175841" cy="393566"/>
+          </a:xfrm>
+          <a:prstGeom prst="rect">
+            <a:avLst/>
+          </a:prstGeom>
+        </p:spPr>
+      </p:pic>
+      <p:sp>
+        <p:nvSpPr>
+          <p:cNvPr id="5" name="ZoneTexte 4"/>
+          <p:cNvSpPr txBox="1"/>
+          <p:nvPr/>
+        </p:nvSpPr>
+        <p:spPr>
+          <a:xfrm>
+            <a:off x="7670520" y="6611779"/>
+            <a:ext cx="1473480" cy="246221"/>
+          </a:xfrm>
+          <a:prstGeom prst="rect">
+            <a:avLst/>
+          </a:prstGeom>
+          <a:noFill/>
+        </p:spPr>
+        <p:txBody>
+          <a:bodyPr wrap="none" rtlCol="0">
+            <a:spAutoFit/>
+          </a:bodyPr>
+          <a:lstStyle/>
+          <a:p>
+            <a:r>
+              <a:rPr lang="fr-FR" sz="1000" dirty="0" smtClean="0"/>
+              <a:t>Rothenflue Stéphane</a:t>
+            </a:r>
+            <a:endParaRPr lang="fr-FR" sz="1000" dirty="0"/>
+          </a:p>
+        </p:txBody>
+      </p:sp>
+    </p:spTree>
+  </p:cSld>
+  <p:clrMapOvr>
+    <a:masterClrMapping/>
+  </p:clrMapOvr>
+</p:sld>
+</file>
+
 <file path=ppt/slides/slide2.xml><?xml version="1.0" encoding="utf-8"?>
 <p:sld xmlns:a="http://schemas.openxmlformats.org/drawingml/2006/main" xmlns:r="http://schemas.openxmlformats.org/officeDocument/2006/relationships" xmlns:p="http://schemas.openxmlformats.org/presentationml/2006/main">
   <p:cSld>
@@ -16581,11 +16807,7 @@
           <a:p>
             <a:r>
               <a:rPr lang="fr-FR" dirty="0" smtClean="0"/>
-              <a:t>La p</a:t>
-            </a:r>
-            <a:r>
-              <a:rPr lang="fr-FR" dirty="0" smtClean="0"/>
-              <a:t>roblématique</a:t>
+              <a:t>La problématique</a:t>
             </a:r>
             <a:endParaRPr lang="fr-FR" dirty="0"/>
           </a:p>
@@ -22591,11 +22813,7 @@
             </a:pPr>
             <a:r>
               <a:rPr lang="fr-FR" dirty="0" smtClean="0"/>
-              <a:t>D</a:t>
-            </a:r>
-            <a:r>
-              <a:rPr lang="fr-FR" dirty="0" smtClean="0"/>
-              <a:t>urée</a:t>
+              <a:t>Durée</a:t>
             </a:r>
           </a:p>
           <a:p>

</xml_diff>

<commit_message>
journal + diagramme de classe
migration vers une interface Fragment
</commit_message>
<xml_diff>
--- a/Cahier des charges + analyse/Presentation dossier projet.pptx
+++ b/Cahier des charges + analyse/Presentation dossier projet.pptx
@@ -5,27 +5,30 @@
     <p:sldMasterId id="2147483696" r:id="rId1"/>
   </p:sldMasterIdLst>
   <p:notesMasterIdLst>
-    <p:notesMasterId r:id="rId20"/>
+    <p:notesMasterId r:id="rId23"/>
   </p:notesMasterIdLst>
   <p:sldIdLst>
     <p:sldId id="256" r:id="rId2"/>
-    <p:sldId id="257" r:id="rId3"/>
-    <p:sldId id="259" r:id="rId4"/>
-    <p:sldId id="258" r:id="rId5"/>
-    <p:sldId id="260" r:id="rId6"/>
-    <p:sldId id="261" r:id="rId7"/>
-    <p:sldId id="262" r:id="rId8"/>
-    <p:sldId id="263" r:id="rId9"/>
-    <p:sldId id="264" r:id="rId10"/>
-    <p:sldId id="265" r:id="rId11"/>
-    <p:sldId id="266" r:id="rId12"/>
-    <p:sldId id="267" r:id="rId13"/>
-    <p:sldId id="268" r:id="rId14"/>
-    <p:sldId id="269" r:id="rId15"/>
-    <p:sldId id="270" r:id="rId16"/>
-    <p:sldId id="272" r:id="rId17"/>
-    <p:sldId id="271" r:id="rId18"/>
-    <p:sldId id="273" r:id="rId19"/>
+    <p:sldId id="277" r:id="rId3"/>
+    <p:sldId id="257" r:id="rId4"/>
+    <p:sldId id="259" r:id="rId5"/>
+    <p:sldId id="258" r:id="rId6"/>
+    <p:sldId id="260" r:id="rId7"/>
+    <p:sldId id="261" r:id="rId8"/>
+    <p:sldId id="262" r:id="rId9"/>
+    <p:sldId id="263" r:id="rId10"/>
+    <p:sldId id="264" r:id="rId11"/>
+    <p:sldId id="265" r:id="rId12"/>
+    <p:sldId id="266" r:id="rId13"/>
+    <p:sldId id="267" r:id="rId14"/>
+    <p:sldId id="268" r:id="rId15"/>
+    <p:sldId id="269" r:id="rId16"/>
+    <p:sldId id="270" r:id="rId17"/>
+    <p:sldId id="272" r:id="rId18"/>
+    <p:sldId id="271" r:id="rId19"/>
+    <p:sldId id="274" r:id="rId20"/>
+    <p:sldId id="273" r:id="rId21"/>
+    <p:sldId id="276" r:id="rId22"/>
   </p:sldIdLst>
   <p:sldSz cx="9144000" cy="6858000" type="screen4x3"/>
   <p:notesSz cx="6858000" cy="9144000"/>
@@ -1842,7 +1845,7 @@
         <a:p>
           <a:r>
             <a:rPr lang="fr-FR" dirty="0" smtClean="0"/>
-            <a:t>Chronomètre</a:t>
+            <a:t>Chronomètres</a:t>
           </a:r>
           <a:endParaRPr lang="fr-FR" dirty="0"/>
         </a:p>
@@ -2858,12 +2861,12 @@
         </a:fontRef>
       </dsp:style>
       <dsp:txBody>
-        <a:bodyPr spcFirstLastPara="0" vert="horz" wrap="square" lIns="125730" tIns="125730" rIns="125730" bIns="125730" numCol="1" spcCol="1270" anchor="ctr" anchorCtr="0">
+        <a:bodyPr spcFirstLastPara="0" vert="horz" wrap="square" lIns="118110" tIns="118110" rIns="118110" bIns="118110" numCol="1" spcCol="1270" anchor="ctr" anchorCtr="0">
           <a:noAutofit/>
         </a:bodyPr>
         <a:lstStyle/>
         <a:p>
-          <a:pPr lvl="0" algn="ctr" defTabSz="1466850">
+          <a:pPr lvl="0" algn="ctr" defTabSz="1377950">
             <a:lnSpc>
               <a:spcPct val="90000"/>
             </a:lnSpc>
@@ -2875,10 +2878,10 @@
             </a:spcAft>
           </a:pPr>
           <a:r>
-            <a:rPr lang="fr-FR" sz="3300" kern="1200" dirty="0" smtClean="0"/>
-            <a:t>Chronomètre</a:t>
+            <a:rPr lang="fr-FR" sz="3100" kern="1200" dirty="0" smtClean="0"/>
+            <a:t>Chronomètres</a:t>
           </a:r>
-          <a:endParaRPr lang="fr-FR" sz="3300" kern="1200" dirty="0"/>
+          <a:endParaRPr lang="fr-FR" sz="3100" kern="1200" dirty="0"/>
         </a:p>
       </dsp:txBody>
       <dsp:txXfrm>
@@ -3111,12 +3114,12 @@
         </a:fontRef>
       </dsp:style>
       <dsp:txBody>
-        <a:bodyPr spcFirstLastPara="0" vert="horz" wrap="square" lIns="125730" tIns="125730" rIns="125730" bIns="125730" numCol="1" spcCol="1270" anchor="ctr" anchorCtr="0">
+        <a:bodyPr spcFirstLastPara="0" vert="horz" wrap="square" lIns="118110" tIns="118110" rIns="118110" bIns="118110" numCol="1" spcCol="1270" anchor="ctr" anchorCtr="0">
           <a:noAutofit/>
         </a:bodyPr>
         <a:lstStyle/>
         <a:p>
-          <a:pPr lvl="0" algn="ctr" defTabSz="1466850">
+          <a:pPr lvl="0" algn="ctr" defTabSz="1377950">
             <a:lnSpc>
               <a:spcPct val="90000"/>
             </a:lnSpc>
@@ -3128,10 +3131,10 @@
             </a:spcAft>
           </a:pPr>
           <a:r>
-            <a:rPr lang="fr-FR" sz="3300" kern="1200" dirty="0" smtClean="0"/>
+            <a:rPr lang="fr-FR" sz="3100" kern="1200" dirty="0" smtClean="0"/>
             <a:t>Assistants</a:t>
           </a:r>
-          <a:endParaRPr lang="fr-FR" sz="3300" kern="1200" dirty="0"/>
+          <a:endParaRPr lang="fr-FR" sz="3100" kern="1200" dirty="0"/>
         </a:p>
       </dsp:txBody>
       <dsp:txXfrm>
@@ -7844,7 +7847,7 @@
             <a:fld id="{B1FE0BAB-EB1C-40EA-B1E2-7035A3D6F2BC}" type="datetimeFigureOut">
               <a:rPr lang="fr-FR" smtClean="0"/>
               <a:pPr/>
-              <a:t>08/03/2015</a:t>
+              <a:t>10/03/2015</a:t>
             </a:fld>
             <a:endParaRPr lang="fr-FR"/>
           </a:p>
@@ -8317,7 +8320,7 @@
             <a:fld id="{E778D26E-D19F-4F50-8B87-8479EF798C55}" type="slidenum">
               <a:rPr lang="fr-FR" smtClean="0"/>
               <a:pPr/>
-              <a:t>10</a:t>
+              <a:t>11</a:t>
             </a:fld>
             <a:endParaRPr lang="fr-FR"/>
           </a:p>
@@ -8429,7 +8432,7 @@
             <a:fld id="{E778D26E-D19F-4F50-8B87-8479EF798C55}" type="slidenum">
               <a:rPr lang="fr-FR" smtClean="0"/>
               <a:pPr/>
-              <a:t>11</a:t>
+              <a:t>12</a:t>
             </a:fld>
             <a:endParaRPr lang="fr-FR"/>
           </a:p>
@@ -8541,7 +8544,7 @@
             <a:fld id="{E778D26E-D19F-4F50-8B87-8479EF798C55}" type="slidenum">
               <a:rPr lang="fr-FR" smtClean="0"/>
               <a:pPr/>
-              <a:t>12</a:t>
+              <a:t>13</a:t>
             </a:fld>
             <a:endParaRPr lang="fr-FR"/>
           </a:p>
@@ -8645,7 +8648,7 @@
             <a:fld id="{E778D26E-D19F-4F50-8B87-8479EF798C55}" type="slidenum">
               <a:rPr lang="fr-FR" smtClean="0"/>
               <a:pPr/>
-              <a:t>13</a:t>
+              <a:t>14</a:t>
             </a:fld>
             <a:endParaRPr lang="fr-FR"/>
           </a:p>
@@ -8749,7 +8752,7 @@
             <a:fld id="{E778D26E-D19F-4F50-8B87-8479EF798C55}" type="slidenum">
               <a:rPr lang="fr-FR" smtClean="0"/>
               <a:pPr/>
-              <a:t>14</a:t>
+              <a:t>15</a:t>
             </a:fld>
             <a:endParaRPr lang="fr-FR"/>
           </a:p>
@@ -8855,7 +8858,7 @@
             <a:fld id="{E778D26E-D19F-4F50-8B87-8479EF798C55}" type="slidenum">
               <a:rPr lang="fr-FR" smtClean="0"/>
               <a:pPr/>
-              <a:t>15</a:t>
+              <a:t>16</a:t>
             </a:fld>
             <a:endParaRPr lang="fr-FR"/>
           </a:p>
@@ -8957,7 +8960,7 @@
             <a:fld id="{E778D26E-D19F-4F50-8B87-8479EF798C55}" type="slidenum">
               <a:rPr lang="fr-FR" smtClean="0"/>
               <a:pPr/>
-              <a:t>16</a:t>
+              <a:t>17</a:t>
             </a:fld>
             <a:endParaRPr lang="fr-FR"/>
           </a:p>
@@ -9047,7 +9050,7 @@
             <a:fld id="{E778D26E-D19F-4F50-8B87-8479EF798C55}" type="slidenum">
               <a:rPr lang="fr-FR" smtClean="0"/>
               <a:pPr/>
-              <a:t>17</a:t>
+              <a:t>18</a:t>
             </a:fld>
             <a:endParaRPr lang="fr-FR"/>
           </a:p>
@@ -9179,7 +9182,7 @@
             <a:fld id="{E778D26E-D19F-4F50-8B87-8479EF798C55}" type="slidenum">
               <a:rPr lang="fr-FR" smtClean="0"/>
               <a:pPr/>
-              <a:t>2</a:t>
+              <a:t>3</a:t>
             </a:fld>
             <a:endParaRPr lang="fr-FR"/>
           </a:p>
@@ -9278,7 +9281,7 @@
             <a:fld id="{E778D26E-D19F-4F50-8B87-8479EF798C55}" type="slidenum">
               <a:rPr lang="fr-FR" smtClean="0"/>
               <a:pPr/>
-              <a:t>3</a:t>
+              <a:t>4</a:t>
             </a:fld>
             <a:endParaRPr lang="fr-FR"/>
           </a:p>
@@ -9390,7 +9393,7 @@
             <a:fld id="{E778D26E-D19F-4F50-8B87-8479EF798C55}" type="slidenum">
               <a:rPr lang="fr-FR" smtClean="0"/>
               <a:pPr/>
-              <a:t>4</a:t>
+              <a:t>5</a:t>
             </a:fld>
             <a:endParaRPr lang="fr-FR"/>
           </a:p>
@@ -9472,7 +9475,7 @@
             <a:fld id="{E778D26E-D19F-4F50-8B87-8479EF798C55}" type="slidenum">
               <a:rPr lang="fr-FR" smtClean="0"/>
               <a:pPr/>
-              <a:t>5</a:t>
+              <a:t>6</a:t>
             </a:fld>
             <a:endParaRPr lang="fr-FR"/>
           </a:p>
@@ -9554,7 +9557,7 @@
             <a:fld id="{E778D26E-D19F-4F50-8B87-8479EF798C55}" type="slidenum">
               <a:rPr lang="fr-FR" smtClean="0"/>
               <a:pPr/>
-              <a:t>6</a:t>
+              <a:t>7</a:t>
             </a:fld>
             <a:endParaRPr lang="fr-FR"/>
           </a:p>
@@ -9636,7 +9639,7 @@
             <a:fld id="{E778D26E-D19F-4F50-8B87-8479EF798C55}" type="slidenum">
               <a:rPr lang="fr-FR" smtClean="0"/>
               <a:pPr/>
-              <a:t>7</a:t>
+              <a:t>8</a:t>
             </a:fld>
             <a:endParaRPr lang="fr-FR"/>
           </a:p>
@@ -9702,8 +9705,13 @@
             </a:r>
             <a:r>
               <a:rPr lang="fr-FR" baseline="0" dirty="0" smtClean="0"/>
-              <a:t> principale de l’application:</a:t>
+              <a:t> principale de l’application</a:t>
             </a:r>
+            <a:r>
+              <a:rPr lang="fr-FR" baseline="0" dirty="0" smtClean="0"/>
+              <a:t>:  3minutes !</a:t>
+            </a:r>
+            <a:endParaRPr lang="fr-FR" baseline="0" dirty="0" smtClean="0"/>
           </a:p>
           <a:p>
             <a:endParaRPr lang="fr-FR" baseline="0" dirty="0" smtClean="0"/>
@@ -9758,7 +9766,7 @@
             <a:fld id="{E778D26E-D19F-4F50-8B87-8479EF798C55}" type="slidenum">
               <a:rPr lang="fr-FR" smtClean="0"/>
               <a:pPr/>
-              <a:t>8</a:t>
+              <a:t>9</a:t>
             </a:fld>
             <a:endParaRPr lang="fr-FR"/>
           </a:p>
@@ -9876,7 +9884,7 @@
             <a:fld id="{E778D26E-D19F-4F50-8B87-8479EF798C55}" type="slidenum">
               <a:rPr lang="fr-FR" smtClean="0"/>
               <a:pPr/>
-              <a:t>9</a:t>
+              <a:t>10</a:t>
             </a:fld>
             <a:endParaRPr lang="fr-FR"/>
           </a:p>
@@ -10516,7 +10524,7 @@
             <a:fld id="{ACDF6120-F1F0-4C60-9FE9-39AC71A9C79D}" type="datetimeFigureOut">
               <a:rPr lang="en-US" smtClean="0"/>
               <a:pPr/>
-              <a:t>3/8/2015</a:t>
+              <a:t>3/10/2015</a:t>
             </a:fld>
             <a:endParaRPr lang="en-US" sz="1600" dirty="0"/>
           </a:p>
@@ -10714,7 +10722,7 @@
             <a:fld id="{ACDF6120-F1F0-4C60-9FE9-39AC71A9C79D}" type="datetimeFigureOut">
               <a:rPr lang="en-US" smtClean="0"/>
               <a:pPr/>
-              <a:t>3/8/2015</a:t>
+              <a:t>3/10/2015</a:t>
             </a:fld>
             <a:endParaRPr lang="en-US"/>
           </a:p>
@@ -10901,7 +10909,7 @@
             <a:fld id="{ACDF6120-F1F0-4C60-9FE9-39AC71A9C79D}" type="datetimeFigureOut">
               <a:rPr lang="en-US" smtClean="0"/>
               <a:pPr/>
-              <a:t>3/8/2015</a:t>
+              <a:t>3/10/2015</a:t>
             </a:fld>
             <a:endParaRPr lang="en-US"/>
           </a:p>
@@ -11053,7 +11061,7 @@
             <a:fld id="{ACDF6120-F1F0-4C60-9FE9-39AC71A9C79D}" type="datetimeFigureOut">
               <a:rPr lang="en-US" smtClean="0"/>
               <a:pPr/>
-              <a:t>3/8/2015</a:t>
+              <a:t>3/10/2015</a:t>
             </a:fld>
             <a:endParaRPr lang="en-US" dirty="0"/>
           </a:p>
@@ -11310,7 +11318,7 @@
             <a:fld id="{ACDF6120-F1F0-4C60-9FE9-39AC71A9C79D}" type="datetimeFigureOut">
               <a:rPr lang="en-US" smtClean="0"/>
               <a:pPr/>
-              <a:t>3/8/2015</a:t>
+              <a:t>3/10/2015</a:t>
             </a:fld>
             <a:endParaRPr lang="en-US" dirty="0"/>
           </a:p>
@@ -11721,7 +11729,7 @@
             <a:fld id="{ACDF6120-F1F0-4C60-9FE9-39AC71A9C79D}" type="datetimeFigureOut">
               <a:rPr lang="en-US" smtClean="0"/>
               <a:pPr/>
-              <a:t>3/8/2015</a:t>
+              <a:t>3/10/2015</a:t>
             </a:fld>
             <a:endParaRPr lang="en-US"/>
           </a:p>
@@ -12169,7 +12177,7 @@
             <a:fld id="{ACDF6120-F1F0-4C60-9FE9-39AC71A9C79D}" type="datetimeFigureOut">
               <a:rPr lang="en-US" smtClean="0"/>
               <a:pPr/>
-              <a:t>3/8/2015</a:t>
+              <a:t>3/10/2015</a:t>
             </a:fld>
             <a:endParaRPr lang="en-US"/>
           </a:p>
@@ -12272,7 +12280,7 @@
             <a:fld id="{ACDF6120-F1F0-4C60-9FE9-39AC71A9C79D}" type="datetimeFigureOut">
               <a:rPr lang="en-US" smtClean="0"/>
               <a:pPr/>
-              <a:t>3/8/2015</a:t>
+              <a:t>3/10/2015</a:t>
             </a:fld>
             <a:endParaRPr lang="en-US"/>
           </a:p>
@@ -12395,7 +12403,7 @@
             <a:fld id="{ACDF6120-F1F0-4C60-9FE9-39AC71A9C79D}" type="datetimeFigureOut">
               <a:rPr lang="en-US" smtClean="0"/>
               <a:pPr/>
-              <a:t>3/8/2015</a:t>
+              <a:t>3/10/2015</a:t>
             </a:fld>
             <a:endParaRPr lang="en-US"/>
           </a:p>
@@ -12671,7 +12679,7 @@
             <a:fld id="{ACDF6120-F1F0-4C60-9FE9-39AC71A9C79D}" type="datetimeFigureOut">
               <a:rPr lang="en-US" smtClean="0"/>
               <a:pPr/>
-              <a:t>3/8/2015</a:t>
+              <a:t>3/10/2015</a:t>
             </a:fld>
             <a:endParaRPr lang="en-US"/>
           </a:p>
@@ -12878,7 +12886,7 @@
             <a:fld id="{ACDF6120-F1F0-4C60-9FE9-39AC71A9C79D}" type="datetimeFigureOut">
               <a:rPr lang="en-US" smtClean="0"/>
               <a:pPr/>
-              <a:t>3/8/2015</a:t>
+              <a:t>3/10/2015</a:t>
             </a:fld>
             <a:endParaRPr lang="en-US"/>
           </a:p>
@@ -13989,7 +13997,7 @@
             <a:fld id="{ACDF6120-F1F0-4C60-9FE9-39AC71A9C79D}" type="datetimeFigureOut">
               <a:rPr lang="en-US" smtClean="0"/>
               <a:pPr/>
-              <a:t>3/8/2015</a:t>
+              <a:t>3/10/2015</a:t>
             </a:fld>
             <a:endParaRPr lang="en-US" sz="1400" dirty="0">
               <a:solidFill>
@@ -14591,8 +14599,8 @@
         </p:blipFill>
         <p:spPr>
           <a:xfrm>
-            <a:off x="1700212" y="1492779"/>
-            <a:ext cx="5743576" cy="4502679"/>
+            <a:off x="1700212" y="1481138"/>
+            <a:ext cx="5743576" cy="4525961"/>
           </a:xfrm>
         </p:spPr>
       </p:pic>
@@ -14608,14 +14616,12 @@
         </p:nvSpPr>
         <p:spPr/>
         <p:txBody>
-          <a:bodyPr>
-            <a:normAutofit fontScale="90000"/>
-          </a:bodyPr>
+          <a:bodyPr/>
           <a:lstStyle/>
           <a:p>
             <a:r>
               <a:rPr lang="fr-FR" dirty="0" smtClean="0"/>
-              <a:t>Interface : Edition de la séquence</a:t>
+              <a:t>Interface : Liste des séquences</a:t>
             </a:r>
             <a:endParaRPr lang="fr-FR" dirty="0"/>
           </a:p>
@@ -14802,8 +14808,8 @@
         </p:blipFill>
         <p:spPr>
           <a:xfrm>
-            <a:off x="1712031" y="1492779"/>
-            <a:ext cx="5719938" cy="4502679"/>
+            <a:off x="1700213" y="1492779"/>
+            <a:ext cx="5743574" cy="4502679"/>
           </a:xfrm>
         </p:spPr>
       </p:pic>
@@ -14820,13 +14826,13 @@
         <p:spPr/>
         <p:txBody>
           <a:bodyPr>
-            <a:normAutofit/>
+            <a:normAutofit fontScale="90000"/>
           </a:bodyPr>
           <a:lstStyle/>
           <a:p>
             <a:r>
               <a:rPr lang="fr-FR" dirty="0" smtClean="0"/>
-              <a:t>Interface : Edition de l’exercice</a:t>
+              <a:t>Interface : Edition de la séquence</a:t>
             </a:r>
             <a:endParaRPr lang="fr-FR" dirty="0"/>
           </a:p>
@@ -15224,8 +15230,8 @@
         </p:blipFill>
         <p:spPr>
           <a:xfrm>
-            <a:off x="1720895" y="1492779"/>
-            <a:ext cx="5702210" cy="4502678"/>
+            <a:off x="1712031" y="1492779"/>
+            <a:ext cx="5719937" cy="4502677"/>
           </a:xfrm>
         </p:spPr>
       </p:pic>
@@ -15242,13 +15248,13 @@
         <p:spPr/>
         <p:txBody>
           <a:bodyPr>
-            <a:normAutofit fontScale="90000"/>
+            <a:normAutofit/>
           </a:bodyPr>
           <a:lstStyle/>
           <a:p>
             <a:r>
               <a:rPr lang="fr-FR" dirty="0" smtClean="0"/>
-              <a:t>Interface : Ajout d’une séquence</a:t>
+              <a:t>Interface : Edition de l’exercice</a:t>
             </a:r>
             <a:endParaRPr lang="fr-FR" dirty="0"/>
           </a:p>
@@ -15435,8 +15441,8 @@
         </p:blipFill>
         <p:spPr>
           <a:xfrm>
-            <a:off x="1720895" y="1502073"/>
-            <a:ext cx="5702210" cy="4484090"/>
+            <a:off x="1720895" y="1492779"/>
+            <a:ext cx="5702210" cy="4502678"/>
           </a:xfrm>
         </p:spPr>
       </p:pic>
@@ -15453,13 +15459,13 @@
         <p:spPr/>
         <p:txBody>
           <a:bodyPr>
-            <a:normAutofit/>
+            <a:normAutofit fontScale="90000"/>
           </a:bodyPr>
           <a:lstStyle/>
           <a:p>
             <a:r>
               <a:rPr lang="fr-FR" dirty="0" smtClean="0"/>
-              <a:t>Interface : Ajout d’un exercice</a:t>
+              <a:t>Interface : Ajout d’une séquence</a:t>
             </a:r>
             <a:endParaRPr lang="fr-FR" dirty="0"/>
           </a:p>
@@ -15612,6 +15618,217 @@
 </file>
 
 <file path=ppt/slides/slide15.xml><?xml version="1.0" encoding="utf-8"?>
+<p:sld xmlns:a="http://schemas.openxmlformats.org/drawingml/2006/main" xmlns:r="http://schemas.openxmlformats.org/officeDocument/2006/relationships" xmlns:p="http://schemas.openxmlformats.org/presentationml/2006/main">
+  <p:cSld>
+    <p:spTree>
+      <p:nvGrpSpPr>
+        <p:cNvPr id="1" name=""/>
+        <p:cNvGrpSpPr/>
+        <p:nvPr/>
+      </p:nvGrpSpPr>
+      <p:grpSpPr>
+        <a:xfrm>
+          <a:off x="0" y="0"/>
+          <a:ext cx="0" cy="0"/>
+          <a:chOff x="0" y="0"/>
+          <a:chExt cx="0" cy="0"/>
+        </a:xfrm>
+      </p:grpSpPr>
+      <p:pic>
+        <p:nvPicPr>
+          <p:cNvPr id="4" name="Espace réservé du contenu 3" descr="Chronometre.png"/>
+          <p:cNvPicPr>
+            <a:picLocks noGrp="1" noChangeAspect="1"/>
+          </p:cNvPicPr>
+          <p:nvPr>
+            <p:ph idx="1"/>
+          </p:nvPr>
+        </p:nvPicPr>
+        <p:blipFill>
+          <a:blip r:embed="rId3" cstate="print"/>
+          <a:stretch>
+            <a:fillRect/>
+          </a:stretch>
+        </p:blipFill>
+        <p:spPr>
+          <a:xfrm>
+            <a:off x="1720896" y="1502073"/>
+            <a:ext cx="5702208" cy="4484090"/>
+          </a:xfrm>
+        </p:spPr>
+      </p:pic>
+      <p:sp>
+        <p:nvSpPr>
+          <p:cNvPr id="3" name="Titre 2"/>
+          <p:cNvSpPr>
+            <a:spLocks noGrp="1"/>
+          </p:cNvSpPr>
+          <p:nvPr>
+            <p:ph type="title"/>
+          </p:nvPr>
+        </p:nvSpPr>
+        <p:spPr/>
+        <p:txBody>
+          <a:bodyPr>
+            <a:normAutofit/>
+          </a:bodyPr>
+          <a:lstStyle/>
+          <a:p>
+            <a:r>
+              <a:rPr lang="fr-FR" dirty="0" smtClean="0"/>
+              <a:t>Interface : Ajout d’un exercice</a:t>
+            </a:r>
+            <a:endParaRPr lang="fr-FR" dirty="0"/>
+          </a:p>
+        </p:txBody>
+      </p:sp>
+      <p:pic>
+        <p:nvPicPr>
+          <p:cNvPr id="5" name="Image 4" descr="logo_cci.gif"/>
+          <p:cNvPicPr/>
+          <p:nvPr/>
+        </p:nvPicPr>
+        <p:blipFill>
+          <a:blip r:embed="rId4" cstate="print"/>
+          <a:stretch>
+            <a:fillRect/>
+          </a:stretch>
+        </p:blipFill>
+        <p:spPr>
+          <a:xfrm>
+            <a:off x="7740352" y="188640"/>
+            <a:ext cx="1175841" cy="393566"/>
+          </a:xfrm>
+          <a:prstGeom prst="rect">
+            <a:avLst/>
+          </a:prstGeom>
+        </p:spPr>
+      </p:pic>
+      <p:sp>
+        <p:nvSpPr>
+          <p:cNvPr id="6" name="ZoneTexte 5"/>
+          <p:cNvSpPr txBox="1"/>
+          <p:nvPr/>
+        </p:nvSpPr>
+        <p:spPr>
+          <a:xfrm>
+            <a:off x="7670520" y="6611779"/>
+            <a:ext cx="1473480" cy="246221"/>
+          </a:xfrm>
+          <a:prstGeom prst="rect">
+            <a:avLst/>
+          </a:prstGeom>
+          <a:noFill/>
+        </p:spPr>
+        <p:txBody>
+          <a:bodyPr wrap="none" rtlCol="0">
+            <a:spAutoFit/>
+          </a:bodyPr>
+          <a:lstStyle/>
+          <a:p>
+            <a:r>
+              <a:rPr lang="fr-FR" sz="1000" dirty="0" smtClean="0"/>
+              <a:t>Rothenflue Stéphane</a:t>
+            </a:r>
+            <a:endParaRPr lang="fr-FR" sz="1000" dirty="0"/>
+          </a:p>
+        </p:txBody>
+      </p:sp>
+    </p:spTree>
+  </p:cSld>
+  <p:clrMapOvr>
+    <a:masterClrMapping/>
+  </p:clrMapOvr>
+  <p:timing>
+    <p:tnLst>
+      <p:par>
+        <p:cTn id="1" dur="indefinite" restart="never" nodeType="tmRoot">
+          <p:childTnLst>
+            <p:seq concurrent="1" nextAc="seek">
+              <p:cTn id="2" dur="indefinite" nodeType="mainSeq">
+                <p:childTnLst>
+                  <p:par>
+                    <p:cTn id="3" fill="hold">
+                      <p:stCondLst>
+                        <p:cond delay="indefinite"/>
+                        <p:cond evt="onBegin" delay="0">
+                          <p:tn val="2"/>
+                        </p:cond>
+                      </p:stCondLst>
+                      <p:childTnLst>
+                        <p:par>
+                          <p:cTn id="4" fill="hold">
+                            <p:stCondLst>
+                              <p:cond delay="0"/>
+                            </p:stCondLst>
+                            <p:childTnLst>
+                              <p:par>
+                                <p:cTn id="5" presetID="10" presetClass="entr" presetSubtype="0" fill="hold" nodeType="afterEffect">
+                                  <p:stCondLst>
+                                    <p:cond delay="0"/>
+                                  </p:stCondLst>
+                                  <p:childTnLst>
+                                    <p:set>
+                                      <p:cBhvr>
+                                        <p:cTn id="6" dur="1" fill="hold">
+                                          <p:stCondLst>
+                                            <p:cond delay="0"/>
+                                          </p:stCondLst>
+                                        </p:cTn>
+                                        <p:tgtEl>
+                                          <p:spTgt spid="4"/>
+                                        </p:tgtEl>
+                                        <p:attrNameLst>
+                                          <p:attrName>style.visibility</p:attrName>
+                                        </p:attrNameLst>
+                                      </p:cBhvr>
+                                      <p:to>
+                                        <p:strVal val="visible"/>
+                                      </p:to>
+                                    </p:set>
+                                    <p:animEffect transition="in" filter="fade">
+                                      <p:cBhvr>
+                                        <p:cTn id="7" dur="2000"/>
+                                        <p:tgtEl>
+                                          <p:spTgt spid="4"/>
+                                        </p:tgtEl>
+                                      </p:cBhvr>
+                                    </p:animEffect>
+                                  </p:childTnLst>
+                                </p:cTn>
+                              </p:par>
+                            </p:childTnLst>
+                          </p:cTn>
+                        </p:par>
+                      </p:childTnLst>
+                    </p:cTn>
+                  </p:par>
+                </p:childTnLst>
+              </p:cTn>
+              <p:prevCondLst>
+                <p:cond evt="onPrev" delay="0">
+                  <p:tgtEl>
+                    <p:sldTgt/>
+                  </p:tgtEl>
+                </p:cond>
+              </p:prevCondLst>
+              <p:nextCondLst>
+                <p:cond evt="onNext" delay="0">
+                  <p:tgtEl>
+                    <p:sldTgt/>
+                  </p:tgtEl>
+                </p:cond>
+              </p:nextCondLst>
+            </p:seq>
+          </p:childTnLst>
+        </p:cTn>
+      </p:par>
+    </p:tnLst>
+  </p:timing>
+</p:sld>
+</file>
+
+<file path=ppt/slides/slide16.xml><?xml version="1.0" encoding="utf-8"?>
 <p:sld xmlns:a="http://schemas.openxmlformats.org/drawingml/2006/main" xmlns:r="http://schemas.openxmlformats.org/officeDocument/2006/relationships" xmlns:p="http://schemas.openxmlformats.org/presentationml/2006/main">
   <p:cSld>
     <p:spTree>
@@ -16030,7 +16247,7 @@
 </p:sld>
 </file>
 
-<file path=ppt/slides/slide16.xml><?xml version="1.0" encoding="utf-8"?>
+<file path=ppt/slides/slide17.xml><?xml version="1.0" encoding="utf-8"?>
 <p:sld xmlns:a="http://schemas.openxmlformats.org/drawingml/2006/main" xmlns:r="http://schemas.openxmlformats.org/officeDocument/2006/relationships" xmlns:p="http://schemas.openxmlformats.org/presentationml/2006/main">
   <p:cSld>
     <p:spTree>
@@ -16241,7 +16458,7 @@
 </p:sld>
 </file>
 
-<file path=ppt/slides/slide17.xml><?xml version="1.0" encoding="utf-8"?>
+<file path=ppt/slides/slide18.xml><?xml version="1.0" encoding="utf-8"?>
 <p:sld xmlns:a="http://schemas.openxmlformats.org/drawingml/2006/main" xmlns:r="http://schemas.openxmlformats.org/officeDocument/2006/relationships" xmlns:p="http://schemas.openxmlformats.org/presentationml/2006/main">
   <p:cSld>
     <p:spTree>
@@ -16667,7 +16884,419 @@
 </p:sld>
 </file>
 
-<file path=ppt/slides/slide18.xml><?xml version="1.0" encoding="utf-8"?>
+<file path=ppt/slides/slide19.xml><?xml version="1.0" encoding="utf-8"?>
+<p:sld xmlns:a="http://schemas.openxmlformats.org/drawingml/2006/main" xmlns:r="http://schemas.openxmlformats.org/officeDocument/2006/relationships" xmlns:p="http://schemas.openxmlformats.org/presentationml/2006/main">
+  <p:cSld>
+    <p:spTree>
+      <p:nvGrpSpPr>
+        <p:cNvPr id="1" name=""/>
+        <p:cNvGrpSpPr/>
+        <p:nvPr/>
+      </p:nvGrpSpPr>
+      <p:grpSpPr>
+        <a:xfrm>
+          <a:off x="0" y="0"/>
+          <a:ext cx="0" cy="0"/>
+          <a:chOff x="0" y="0"/>
+          <a:chExt cx="0" cy="0"/>
+        </a:xfrm>
+      </p:grpSpPr>
+      <p:sp>
+        <p:nvSpPr>
+          <p:cNvPr id="3" name="Titre 2"/>
+          <p:cNvSpPr>
+            <a:spLocks noGrp="1"/>
+          </p:cNvSpPr>
+          <p:nvPr>
+            <p:ph type="title"/>
+          </p:nvPr>
+        </p:nvSpPr>
+        <p:spPr/>
+        <p:txBody>
+          <a:bodyPr/>
+          <a:lstStyle/>
+          <a:p>
+            <a:r>
+              <a:rPr lang="fr-FR" dirty="0" smtClean="0"/>
+              <a:t>Diagramme de Gantt</a:t>
+            </a:r>
+            <a:endParaRPr lang="fr-FR" dirty="0"/>
+          </a:p>
+        </p:txBody>
+      </p:sp>
+      <p:pic>
+        <p:nvPicPr>
+          <p:cNvPr id="1026" name="Picture 2"/>
+          <p:cNvPicPr>
+            <a:picLocks noGrp="1" noChangeAspect="1" noChangeArrowheads="1"/>
+          </p:cNvPicPr>
+          <p:nvPr>
+            <p:ph idx="1"/>
+          </p:nvPr>
+        </p:nvPicPr>
+        <p:blipFill>
+          <a:blip r:embed="rId2" cstate="print"/>
+          <a:srcRect/>
+          <a:stretch>
+            <a:fillRect/>
+          </a:stretch>
+        </p:blipFill>
+        <p:spPr bwMode="auto">
+          <a:xfrm>
+            <a:off x="1439652" y="1484784"/>
+            <a:ext cx="6264696" cy="5056231"/>
+          </a:xfrm>
+          <a:prstGeom prst="rect">
+            <a:avLst/>
+          </a:prstGeom>
+          <a:solidFill>
+            <a:srgbClr val="FFFFFF"/>
+          </a:solidFill>
+          <a:ln w="9525">
+            <a:solidFill>
+              <a:srgbClr val="000000"/>
+            </a:solidFill>
+            <a:miter lim="800000"/>
+            <a:headEnd/>
+            <a:tailEnd/>
+          </a:ln>
+        </p:spPr>
+      </p:pic>
+    </p:spTree>
+  </p:cSld>
+  <p:clrMapOvr>
+    <a:masterClrMapping/>
+  </p:clrMapOvr>
+  <p:timing>
+    <p:tnLst>
+      <p:par>
+        <p:cTn id="1" dur="indefinite" restart="never" nodeType="tmRoot"/>
+      </p:par>
+    </p:tnLst>
+  </p:timing>
+</p:sld>
+</file>
+
+<file path=ppt/slides/slide2.xml><?xml version="1.0" encoding="utf-8"?>
+<p:sld xmlns:a="http://schemas.openxmlformats.org/drawingml/2006/main" xmlns:r="http://schemas.openxmlformats.org/officeDocument/2006/relationships" xmlns:p="http://schemas.openxmlformats.org/presentationml/2006/main">
+  <p:cSld>
+    <p:spTree>
+      <p:nvGrpSpPr>
+        <p:cNvPr id="1" name=""/>
+        <p:cNvGrpSpPr/>
+        <p:nvPr/>
+      </p:nvGrpSpPr>
+      <p:grpSpPr>
+        <a:xfrm>
+          <a:off x="0" y="0"/>
+          <a:ext cx="0" cy="0"/>
+          <a:chOff x="0" y="0"/>
+          <a:chExt cx="0" cy="0"/>
+        </a:xfrm>
+      </p:grpSpPr>
+      <p:sp>
+        <p:nvSpPr>
+          <p:cNvPr id="2" name="Espace réservé du contenu 1"/>
+          <p:cNvSpPr>
+            <a:spLocks noGrp="1"/>
+          </p:cNvSpPr>
+          <p:nvPr>
+            <p:ph idx="1"/>
+          </p:nvPr>
+        </p:nvSpPr>
+        <p:spPr/>
+        <p:txBody>
+          <a:bodyPr/>
+          <a:lstStyle/>
+          <a:p>
+            <a:pPr>
+              <a:lnSpc>
+                <a:spcPct val="300000"/>
+              </a:lnSpc>
+            </a:pPr>
+            <a:r>
+              <a:rPr lang="fr-FR" dirty="0" smtClean="0"/>
+              <a:t>Contexte</a:t>
+            </a:r>
+          </a:p>
+          <a:p>
+            <a:pPr>
+              <a:lnSpc>
+                <a:spcPct val="300000"/>
+              </a:lnSpc>
+            </a:pPr>
+            <a:r>
+              <a:rPr lang="fr-FR" dirty="0" smtClean="0"/>
+              <a:t>Interface</a:t>
+            </a:r>
+          </a:p>
+          <a:p>
+            <a:pPr>
+              <a:lnSpc>
+                <a:spcPct val="300000"/>
+              </a:lnSpc>
+            </a:pPr>
+            <a:r>
+              <a:rPr lang="fr-FR" dirty="0" smtClean="0"/>
+              <a:t>Déroulement du projet</a:t>
+            </a:r>
+          </a:p>
+          <a:p>
+            <a:pPr>
+              <a:buNone/>
+            </a:pPr>
+            <a:endParaRPr lang="fr-FR" dirty="0"/>
+          </a:p>
+        </p:txBody>
+      </p:sp>
+      <p:sp>
+        <p:nvSpPr>
+          <p:cNvPr id="3" name="Titre 2"/>
+          <p:cNvSpPr>
+            <a:spLocks noGrp="1"/>
+          </p:cNvSpPr>
+          <p:nvPr>
+            <p:ph type="title"/>
+          </p:nvPr>
+        </p:nvSpPr>
+        <p:spPr/>
+        <p:txBody>
+          <a:bodyPr/>
+          <a:lstStyle/>
+          <a:p>
+            <a:r>
+              <a:rPr lang="fr-FR" dirty="0" smtClean="0"/>
+              <a:t>Sommaire</a:t>
+            </a:r>
+            <a:endParaRPr lang="fr-FR" dirty="0"/>
+          </a:p>
+        </p:txBody>
+      </p:sp>
+    </p:spTree>
+  </p:cSld>
+  <p:clrMapOvr>
+    <a:masterClrMapping/>
+  </p:clrMapOvr>
+  <p:timing>
+    <p:tnLst>
+      <p:par>
+        <p:cTn id="1" dur="indefinite" restart="never" nodeType="tmRoot">
+          <p:childTnLst>
+            <p:seq concurrent="1" nextAc="seek">
+              <p:cTn id="2" dur="indefinite" nodeType="mainSeq">
+                <p:childTnLst>
+                  <p:par>
+                    <p:cTn id="3" fill="hold">
+                      <p:stCondLst>
+                        <p:cond delay="indefinite"/>
+                      </p:stCondLst>
+                      <p:childTnLst>
+                        <p:par>
+                          <p:cTn id="4" fill="hold">
+                            <p:stCondLst>
+                              <p:cond delay="0"/>
+                            </p:stCondLst>
+                            <p:childTnLst>
+                              <p:par>
+                                <p:cTn id="5" presetID="10" presetClass="entr" presetSubtype="0" fill="hold" grpId="0" nodeType="clickEffect">
+                                  <p:stCondLst>
+                                    <p:cond delay="0"/>
+                                  </p:stCondLst>
+                                  <p:childTnLst>
+                                    <p:set>
+                                      <p:cBhvr>
+                                        <p:cTn id="6" dur="1" fill="hold">
+                                          <p:stCondLst>
+                                            <p:cond delay="0"/>
+                                          </p:stCondLst>
+                                        </p:cTn>
+                                        <p:tgtEl>
+                                          <p:spTgt spid="2">
+                                            <p:txEl>
+                                              <p:pRg st="0" end="0"/>
+                                            </p:txEl>
+                                          </p:spTgt>
+                                        </p:tgtEl>
+                                        <p:attrNameLst>
+                                          <p:attrName>style.visibility</p:attrName>
+                                        </p:attrNameLst>
+                                      </p:cBhvr>
+                                      <p:to>
+                                        <p:strVal val="visible"/>
+                                      </p:to>
+                                    </p:set>
+                                    <p:animEffect transition="in" filter="fade">
+                                      <p:cBhvr>
+                                        <p:cTn id="7" dur="2000"/>
+                                        <p:tgtEl>
+                                          <p:spTgt spid="2">
+                                            <p:txEl>
+                                              <p:pRg st="0" end="0"/>
+                                            </p:txEl>
+                                          </p:spTgt>
+                                        </p:tgtEl>
+                                      </p:cBhvr>
+                                    </p:animEffect>
+                                  </p:childTnLst>
+                                </p:cTn>
+                              </p:par>
+                            </p:childTnLst>
+                          </p:cTn>
+                        </p:par>
+                      </p:childTnLst>
+                    </p:cTn>
+                  </p:par>
+                  <p:par>
+                    <p:cTn id="8" fill="hold">
+                      <p:stCondLst>
+                        <p:cond delay="indefinite"/>
+                      </p:stCondLst>
+                      <p:childTnLst>
+                        <p:par>
+                          <p:cTn id="9" fill="hold">
+                            <p:stCondLst>
+                              <p:cond delay="0"/>
+                            </p:stCondLst>
+                            <p:childTnLst>
+                              <p:par>
+                                <p:cTn id="10" presetID="10" presetClass="entr" presetSubtype="0" fill="hold" grpId="0" nodeType="clickEffect">
+                                  <p:stCondLst>
+                                    <p:cond delay="0"/>
+                                  </p:stCondLst>
+                                  <p:childTnLst>
+                                    <p:set>
+                                      <p:cBhvr>
+                                        <p:cTn id="11" dur="1" fill="hold">
+                                          <p:stCondLst>
+                                            <p:cond delay="0"/>
+                                          </p:stCondLst>
+                                        </p:cTn>
+                                        <p:tgtEl>
+                                          <p:spTgt spid="2">
+                                            <p:txEl>
+                                              <p:pRg st="1" end="1"/>
+                                            </p:txEl>
+                                          </p:spTgt>
+                                        </p:tgtEl>
+                                        <p:attrNameLst>
+                                          <p:attrName>style.visibility</p:attrName>
+                                        </p:attrNameLst>
+                                      </p:cBhvr>
+                                      <p:to>
+                                        <p:strVal val="visible"/>
+                                      </p:to>
+                                    </p:set>
+                                    <p:animEffect transition="in" filter="fade">
+                                      <p:cBhvr>
+                                        <p:cTn id="12" dur="2000"/>
+                                        <p:tgtEl>
+                                          <p:spTgt spid="2">
+                                            <p:txEl>
+                                              <p:pRg st="1" end="1"/>
+                                            </p:txEl>
+                                          </p:spTgt>
+                                        </p:tgtEl>
+                                      </p:cBhvr>
+                                    </p:animEffect>
+                                  </p:childTnLst>
+                                </p:cTn>
+                              </p:par>
+                            </p:childTnLst>
+                          </p:cTn>
+                        </p:par>
+                      </p:childTnLst>
+                    </p:cTn>
+                  </p:par>
+                  <p:par>
+                    <p:cTn id="13" fill="hold">
+                      <p:stCondLst>
+                        <p:cond delay="indefinite"/>
+                      </p:stCondLst>
+                      <p:childTnLst>
+                        <p:par>
+                          <p:cTn id="14" fill="hold">
+                            <p:stCondLst>
+                              <p:cond delay="0"/>
+                            </p:stCondLst>
+                            <p:childTnLst>
+                              <p:par>
+                                <p:cTn id="15" presetID="10" presetClass="entr" presetSubtype="0" fill="hold" grpId="0" nodeType="clickEffect">
+                                  <p:stCondLst>
+                                    <p:cond delay="0"/>
+                                  </p:stCondLst>
+                                  <p:childTnLst>
+                                    <p:set>
+                                      <p:cBhvr>
+                                        <p:cTn id="16" dur="1" fill="hold">
+                                          <p:stCondLst>
+                                            <p:cond delay="0"/>
+                                          </p:stCondLst>
+                                        </p:cTn>
+                                        <p:tgtEl>
+                                          <p:spTgt spid="2">
+                                            <p:txEl>
+                                              <p:pRg st="2" end="2"/>
+                                            </p:txEl>
+                                          </p:spTgt>
+                                        </p:tgtEl>
+                                        <p:attrNameLst>
+                                          <p:attrName>style.visibility</p:attrName>
+                                        </p:attrNameLst>
+                                      </p:cBhvr>
+                                      <p:to>
+                                        <p:strVal val="visible"/>
+                                      </p:to>
+                                    </p:set>
+                                    <p:animEffect transition="in" filter="fade">
+                                      <p:cBhvr>
+                                        <p:cTn id="17" dur="2000"/>
+                                        <p:tgtEl>
+                                          <p:spTgt spid="2">
+                                            <p:txEl>
+                                              <p:pRg st="2" end="2"/>
+                                            </p:txEl>
+                                          </p:spTgt>
+                                        </p:tgtEl>
+                                      </p:cBhvr>
+                                    </p:animEffect>
+                                  </p:childTnLst>
+                                </p:cTn>
+                              </p:par>
+                            </p:childTnLst>
+                          </p:cTn>
+                        </p:par>
+                      </p:childTnLst>
+                    </p:cTn>
+                  </p:par>
+                </p:childTnLst>
+              </p:cTn>
+              <p:prevCondLst>
+                <p:cond evt="onPrev" delay="0">
+                  <p:tgtEl>
+                    <p:sldTgt/>
+                  </p:tgtEl>
+                </p:cond>
+              </p:prevCondLst>
+              <p:nextCondLst>
+                <p:cond evt="onNext" delay="0">
+                  <p:tgtEl>
+                    <p:sldTgt/>
+                  </p:tgtEl>
+                </p:cond>
+              </p:nextCondLst>
+            </p:seq>
+          </p:childTnLst>
+        </p:cTn>
+      </p:par>
+    </p:tnLst>
+    <p:bldLst>
+      <p:bldP spid="2" grpId="0" build="p"/>
+    </p:bldLst>
+  </p:timing>
+</p:sld>
+</file>
+
+<file path=ppt/slides/slide20.xml><?xml version="1.0" encoding="utf-8"?>
 <p:sld xmlns:a="http://schemas.openxmlformats.org/drawingml/2006/main" xmlns:r="http://schemas.openxmlformats.org/officeDocument/2006/relationships" xmlns:p="http://schemas.openxmlformats.org/presentationml/2006/main">
   <p:cSld>
     <p:spTree>
@@ -16770,10 +17399,134 @@
   <p:clrMapOvr>
     <a:masterClrMapping/>
   </p:clrMapOvr>
+  <p:timing>
+    <p:tnLst>
+      <p:par>
+        <p:cTn id="1" dur="indefinite" restart="never" nodeType="tmRoot"/>
+      </p:par>
+    </p:tnLst>
+  </p:timing>
 </p:sld>
 </file>
 
-<file path=ppt/slides/slide2.xml><?xml version="1.0" encoding="utf-8"?>
+<file path=ppt/slides/slide21.xml><?xml version="1.0" encoding="utf-8"?>
+<p:sld xmlns:a="http://schemas.openxmlformats.org/drawingml/2006/main" xmlns:r="http://schemas.openxmlformats.org/officeDocument/2006/relationships" xmlns:p="http://schemas.openxmlformats.org/presentationml/2006/main">
+  <p:cSld>
+    <p:spTree>
+      <p:nvGrpSpPr>
+        <p:cNvPr id="1" name=""/>
+        <p:cNvGrpSpPr/>
+        <p:nvPr/>
+      </p:nvGrpSpPr>
+      <p:grpSpPr>
+        <a:xfrm>
+          <a:off x="0" y="0"/>
+          <a:ext cx="0" cy="0"/>
+          <a:chOff x="0" y="0"/>
+          <a:chExt cx="0" cy="0"/>
+        </a:xfrm>
+      </p:grpSpPr>
+      <p:sp>
+        <p:nvSpPr>
+          <p:cNvPr id="3" name="Titre 2"/>
+          <p:cNvSpPr>
+            <a:spLocks noGrp="1"/>
+          </p:cNvSpPr>
+          <p:nvPr>
+            <p:ph type="title"/>
+          </p:nvPr>
+        </p:nvSpPr>
+        <p:spPr>
+          <a:xfrm>
+            <a:off x="467544" y="2060848"/>
+            <a:ext cx="8229600" cy="1143000"/>
+          </a:xfrm>
+        </p:spPr>
+        <p:txBody>
+          <a:bodyPr/>
+          <a:lstStyle/>
+          <a:p>
+            <a:pPr algn="ctr"/>
+            <a:r>
+              <a:rPr lang="fr-FR" dirty="0" smtClean="0"/>
+              <a:t>Merci de </a:t>
+            </a:r>
+            <a:r>
+              <a:rPr lang="fr-FR" smtClean="0"/>
+              <a:t>votre attention</a:t>
+            </a:r>
+            <a:endParaRPr lang="fr-FR" dirty="0"/>
+          </a:p>
+        </p:txBody>
+      </p:sp>
+      <p:pic>
+        <p:nvPicPr>
+          <p:cNvPr id="4" name="Image 3" descr="logo_cci.gif"/>
+          <p:cNvPicPr/>
+          <p:nvPr/>
+        </p:nvPicPr>
+        <p:blipFill>
+          <a:blip r:embed="rId2" cstate="print"/>
+          <a:stretch>
+            <a:fillRect/>
+          </a:stretch>
+        </p:blipFill>
+        <p:spPr>
+          <a:xfrm>
+            <a:off x="7740352" y="188640"/>
+            <a:ext cx="1175841" cy="393566"/>
+          </a:xfrm>
+          <a:prstGeom prst="rect">
+            <a:avLst/>
+          </a:prstGeom>
+        </p:spPr>
+      </p:pic>
+      <p:sp>
+        <p:nvSpPr>
+          <p:cNvPr id="5" name="ZoneTexte 4"/>
+          <p:cNvSpPr txBox="1"/>
+          <p:nvPr/>
+        </p:nvSpPr>
+        <p:spPr>
+          <a:xfrm>
+            <a:off x="7670520" y="6611779"/>
+            <a:ext cx="1473480" cy="246221"/>
+          </a:xfrm>
+          <a:prstGeom prst="rect">
+            <a:avLst/>
+          </a:prstGeom>
+          <a:noFill/>
+        </p:spPr>
+        <p:txBody>
+          <a:bodyPr wrap="none" rtlCol="0">
+            <a:spAutoFit/>
+          </a:bodyPr>
+          <a:lstStyle/>
+          <a:p>
+            <a:r>
+              <a:rPr lang="fr-FR" sz="1000" dirty="0" smtClean="0"/>
+              <a:t>Rothenflue Stéphane</a:t>
+            </a:r>
+            <a:endParaRPr lang="fr-FR" sz="1000" dirty="0"/>
+          </a:p>
+        </p:txBody>
+      </p:sp>
+    </p:spTree>
+  </p:cSld>
+  <p:clrMapOvr>
+    <a:masterClrMapping/>
+  </p:clrMapOvr>
+  <p:timing>
+    <p:tnLst>
+      <p:par>
+        <p:cTn id="1" dur="indefinite" restart="never" nodeType="tmRoot"/>
+      </p:par>
+    </p:tnLst>
+  </p:timing>
+</p:sld>
+</file>
+
+<file path=ppt/slides/slide3.xml><?xml version="1.0" encoding="utf-8"?>
 <p:sld xmlns:a="http://schemas.openxmlformats.org/drawingml/2006/main" xmlns:r="http://schemas.openxmlformats.org/officeDocument/2006/relationships" xmlns:p="http://schemas.openxmlformats.org/presentationml/2006/main">
   <p:cSld>
     <p:spTree>
@@ -19285,7 +20038,7 @@
 </p:sld>
 </file>
 
-<file path=ppt/slides/slide3.xml><?xml version="1.0" encoding="utf-8"?>
+<file path=ppt/slides/slide4.xml><?xml version="1.0" encoding="utf-8"?>
 <p:sld xmlns:a="http://schemas.openxmlformats.org/drawingml/2006/main" xmlns:r="http://schemas.openxmlformats.org/officeDocument/2006/relationships" xmlns:p="http://schemas.openxmlformats.org/presentationml/2006/main">
   <p:cSld>
     <p:spTree>
@@ -21605,7 +22358,7 @@
 </p:sld>
 </file>
 
-<file path=ppt/slides/slide4.xml><?xml version="1.0" encoding="utf-8"?>
+<file path=ppt/slides/slide5.xml><?xml version="1.0" encoding="utf-8"?>
 <p:sld xmlns:a="http://schemas.openxmlformats.org/drawingml/2006/main" xmlns:r="http://schemas.openxmlformats.org/officeDocument/2006/relationships" xmlns:p="http://schemas.openxmlformats.org/presentationml/2006/main">
   <p:cSld>
     <p:spTree>
@@ -22135,7 +22888,7 @@
 </p:sld>
 </file>
 
-<file path=ppt/slides/slide5.xml><?xml version="1.0" encoding="utf-8"?>
+<file path=ppt/slides/slide6.xml><?xml version="1.0" encoding="utf-8"?>
 <p:sld xmlns:a="http://schemas.openxmlformats.org/drawingml/2006/main" xmlns:r="http://schemas.openxmlformats.org/officeDocument/2006/relationships" xmlns:p="http://schemas.openxmlformats.org/presentationml/2006/main">
   <p:cSld>
     <p:spTree>
@@ -22750,7 +23503,7 @@
 </p:sld>
 </file>
 
-<file path=ppt/slides/slide6.xml><?xml version="1.0" encoding="utf-8"?>
+<file path=ppt/slides/slide7.xml><?xml version="1.0" encoding="utf-8"?>
 <p:sld xmlns:a="http://schemas.openxmlformats.org/drawingml/2006/main" xmlns:r="http://schemas.openxmlformats.org/officeDocument/2006/relationships" xmlns:p="http://schemas.openxmlformats.org/presentationml/2006/main">
   <p:cSld>
     <p:spTree>
@@ -23589,7 +24342,7 @@
 </p:sld>
 </file>
 
-<file path=ppt/slides/slide7.xml><?xml version="1.0" encoding="utf-8"?>
+<file path=ppt/slides/slide8.xml><?xml version="1.0" encoding="utf-8"?>
 <p:sld xmlns:a="http://schemas.openxmlformats.org/drawingml/2006/main" xmlns:r="http://schemas.openxmlformats.org/officeDocument/2006/relationships" xmlns:p="http://schemas.openxmlformats.org/presentationml/2006/main">
   <p:cSld>
     <p:spTree>
@@ -24202,7 +24955,7 @@
 </p:sld>
 </file>
 
-<file path=ppt/slides/slide8.xml><?xml version="1.0" encoding="utf-8"?>
+<file path=ppt/slides/slide9.xml><?xml version="1.0" encoding="utf-8"?>
 <p:sld xmlns:a="http://schemas.openxmlformats.org/drawingml/2006/main" xmlns:r="http://schemas.openxmlformats.org/officeDocument/2006/relationships" xmlns:p="http://schemas.openxmlformats.org/presentationml/2006/main">
   <p:cSld>
     <p:spTree>
@@ -24238,7 +24991,7 @@
         <p:spPr>
           <a:xfrm>
             <a:off x="1697242" y="1481138"/>
-            <a:ext cx="5749516" cy="4525962"/>
+            <a:ext cx="5749516" cy="4525961"/>
           </a:xfrm>
         </p:spPr>
       </p:pic>
@@ -24290,215 +25043,6 @@
       <p:sp>
         <p:nvSpPr>
           <p:cNvPr id="7" name="ZoneTexte 6"/>
-          <p:cNvSpPr txBox="1"/>
-          <p:nvPr/>
-        </p:nvSpPr>
-        <p:spPr>
-          <a:xfrm>
-            <a:off x="7670520" y="6611779"/>
-            <a:ext cx="1473480" cy="246221"/>
-          </a:xfrm>
-          <a:prstGeom prst="rect">
-            <a:avLst/>
-          </a:prstGeom>
-          <a:noFill/>
-        </p:spPr>
-        <p:txBody>
-          <a:bodyPr wrap="none" rtlCol="0">
-            <a:spAutoFit/>
-          </a:bodyPr>
-          <a:lstStyle/>
-          <a:p>
-            <a:r>
-              <a:rPr lang="fr-FR" sz="1000" dirty="0" smtClean="0"/>
-              <a:t>Rothenflue Stéphane</a:t>
-            </a:r>
-            <a:endParaRPr lang="fr-FR" sz="1000" dirty="0"/>
-          </a:p>
-        </p:txBody>
-      </p:sp>
-    </p:spTree>
-  </p:cSld>
-  <p:clrMapOvr>
-    <a:masterClrMapping/>
-  </p:clrMapOvr>
-  <p:timing>
-    <p:tnLst>
-      <p:par>
-        <p:cTn id="1" dur="indefinite" restart="never" nodeType="tmRoot">
-          <p:childTnLst>
-            <p:seq concurrent="1" nextAc="seek">
-              <p:cTn id="2" dur="indefinite" nodeType="mainSeq">
-                <p:childTnLst>
-                  <p:par>
-                    <p:cTn id="3" fill="hold">
-                      <p:stCondLst>
-                        <p:cond delay="indefinite"/>
-                        <p:cond evt="onBegin" delay="0">
-                          <p:tn val="2"/>
-                        </p:cond>
-                      </p:stCondLst>
-                      <p:childTnLst>
-                        <p:par>
-                          <p:cTn id="4" fill="hold">
-                            <p:stCondLst>
-                              <p:cond delay="0"/>
-                            </p:stCondLst>
-                            <p:childTnLst>
-                              <p:par>
-                                <p:cTn id="5" presetID="10" presetClass="entr" presetSubtype="0" fill="hold" nodeType="afterEffect">
-                                  <p:stCondLst>
-                                    <p:cond delay="0"/>
-                                  </p:stCondLst>
-                                  <p:childTnLst>
-                                    <p:set>
-                                      <p:cBhvr>
-                                        <p:cTn id="6" dur="1" fill="hold">
-                                          <p:stCondLst>
-                                            <p:cond delay="0"/>
-                                          </p:stCondLst>
-                                        </p:cTn>
-                                        <p:tgtEl>
-                                          <p:spTgt spid="4"/>
-                                        </p:tgtEl>
-                                        <p:attrNameLst>
-                                          <p:attrName>style.visibility</p:attrName>
-                                        </p:attrNameLst>
-                                      </p:cBhvr>
-                                      <p:to>
-                                        <p:strVal val="visible"/>
-                                      </p:to>
-                                    </p:set>
-                                    <p:animEffect transition="in" filter="fade">
-                                      <p:cBhvr>
-                                        <p:cTn id="7" dur="2000"/>
-                                        <p:tgtEl>
-                                          <p:spTgt spid="4"/>
-                                        </p:tgtEl>
-                                      </p:cBhvr>
-                                    </p:animEffect>
-                                  </p:childTnLst>
-                                </p:cTn>
-                              </p:par>
-                            </p:childTnLst>
-                          </p:cTn>
-                        </p:par>
-                      </p:childTnLst>
-                    </p:cTn>
-                  </p:par>
-                </p:childTnLst>
-              </p:cTn>
-              <p:prevCondLst>
-                <p:cond evt="onPrev" delay="0">
-                  <p:tgtEl>
-                    <p:sldTgt/>
-                  </p:tgtEl>
-                </p:cond>
-              </p:prevCondLst>
-              <p:nextCondLst>
-                <p:cond evt="onNext" delay="0">
-                  <p:tgtEl>
-                    <p:sldTgt/>
-                  </p:tgtEl>
-                </p:cond>
-              </p:nextCondLst>
-            </p:seq>
-          </p:childTnLst>
-        </p:cTn>
-      </p:par>
-    </p:tnLst>
-  </p:timing>
-</p:sld>
-</file>
-
-<file path=ppt/slides/slide9.xml><?xml version="1.0" encoding="utf-8"?>
-<p:sld xmlns:a="http://schemas.openxmlformats.org/drawingml/2006/main" xmlns:r="http://schemas.openxmlformats.org/officeDocument/2006/relationships" xmlns:p="http://schemas.openxmlformats.org/presentationml/2006/main">
-  <p:cSld>
-    <p:spTree>
-      <p:nvGrpSpPr>
-        <p:cNvPr id="1" name=""/>
-        <p:cNvGrpSpPr/>
-        <p:nvPr/>
-      </p:nvGrpSpPr>
-      <p:grpSpPr>
-        <a:xfrm>
-          <a:off x="0" y="0"/>
-          <a:ext cx="0" cy="0"/>
-          <a:chOff x="0" y="0"/>
-          <a:chExt cx="0" cy="0"/>
-        </a:xfrm>
-      </p:grpSpPr>
-      <p:pic>
-        <p:nvPicPr>
-          <p:cNvPr id="4" name="Espace réservé du contenu 3" descr="Chronometre.png"/>
-          <p:cNvPicPr>
-            <a:picLocks noGrp="1" noChangeAspect="1"/>
-          </p:cNvPicPr>
-          <p:nvPr>
-            <p:ph idx="1"/>
-          </p:nvPr>
-        </p:nvPicPr>
-        <p:blipFill>
-          <a:blip r:embed="rId3" cstate="print"/>
-          <a:stretch>
-            <a:fillRect/>
-          </a:stretch>
-        </p:blipFill>
-        <p:spPr>
-          <a:xfrm>
-            <a:off x="1700212" y="1481138"/>
-            <a:ext cx="5743576" cy="4525962"/>
-          </a:xfrm>
-        </p:spPr>
-      </p:pic>
-      <p:sp>
-        <p:nvSpPr>
-          <p:cNvPr id="3" name="Titre 2"/>
-          <p:cNvSpPr>
-            <a:spLocks noGrp="1"/>
-          </p:cNvSpPr>
-          <p:nvPr>
-            <p:ph type="title"/>
-          </p:nvPr>
-        </p:nvSpPr>
-        <p:spPr/>
-        <p:txBody>
-          <a:bodyPr/>
-          <a:lstStyle/>
-          <a:p>
-            <a:r>
-              <a:rPr lang="fr-FR" dirty="0" smtClean="0"/>
-              <a:t>Interface : Liste des séquences</a:t>
-            </a:r>
-            <a:endParaRPr lang="fr-FR" dirty="0"/>
-          </a:p>
-        </p:txBody>
-      </p:sp>
-      <p:pic>
-        <p:nvPicPr>
-          <p:cNvPr id="5" name="Image 4" descr="logo_cci.gif"/>
-          <p:cNvPicPr/>
-          <p:nvPr/>
-        </p:nvPicPr>
-        <p:blipFill>
-          <a:blip r:embed="rId4" cstate="print"/>
-          <a:stretch>
-            <a:fillRect/>
-          </a:stretch>
-        </p:blipFill>
-        <p:spPr>
-          <a:xfrm>
-            <a:off x="7740352" y="188640"/>
-            <a:ext cx="1175841" cy="393566"/>
-          </a:xfrm>
-          <a:prstGeom prst="rect">
-            <a:avLst/>
-          </a:prstGeom>
-        </p:spPr>
-      </p:pic>
-      <p:sp>
-        <p:nvSpPr>
-          <p:cNvPr id="6" name="ZoneTexte 5"/>
           <p:cNvSpPr txBox="1"/>
           <p:nvPr/>
         </p:nvSpPr>

</xml_diff>